<commit_message>
Progress Report PowerPoint mostly done
</commit_message>
<xml_diff>
--- a/Progress Report/Progress report.pptx
+++ b/Progress Report/Progress report.pptx
@@ -7,7 +7,39 @@
   <p:sldIdLst>
     <p:sldId id="256" r:id="rId2"/>
     <p:sldId id="257" r:id="rId3"/>
-    <p:sldId id="258" r:id="rId4"/>
+    <p:sldId id="292" r:id="rId4"/>
+    <p:sldId id="258" r:id="rId5"/>
+    <p:sldId id="260" r:id="rId6"/>
+    <p:sldId id="285" r:id="rId7"/>
+    <p:sldId id="286" r:id="rId8"/>
+    <p:sldId id="287" r:id="rId9"/>
+    <p:sldId id="261" r:id="rId10"/>
+    <p:sldId id="262" r:id="rId11"/>
+    <p:sldId id="263" r:id="rId12"/>
+    <p:sldId id="264" r:id="rId13"/>
+    <p:sldId id="265" r:id="rId14"/>
+    <p:sldId id="266" r:id="rId15"/>
+    <p:sldId id="267" r:id="rId16"/>
+    <p:sldId id="291" r:id="rId17"/>
+    <p:sldId id="269" r:id="rId18"/>
+    <p:sldId id="270" r:id="rId19"/>
+    <p:sldId id="288" r:id="rId20"/>
+    <p:sldId id="271" r:id="rId21"/>
+    <p:sldId id="272" r:id="rId22"/>
+    <p:sldId id="273" r:id="rId23"/>
+    <p:sldId id="289" r:id="rId24"/>
+    <p:sldId id="274" r:id="rId25"/>
+    <p:sldId id="277" r:id="rId26"/>
+    <p:sldId id="278" r:id="rId27"/>
+    <p:sldId id="279" r:id="rId28"/>
+    <p:sldId id="280" r:id="rId29"/>
+    <p:sldId id="281" r:id="rId30"/>
+    <p:sldId id="282" r:id="rId31"/>
+    <p:sldId id="283" r:id="rId32"/>
+    <p:sldId id="284" r:id="rId33"/>
+    <p:sldId id="293" r:id="rId34"/>
+    <p:sldId id="294" r:id="rId35"/>
+    <p:sldId id="276" r:id="rId36"/>
   </p:sldIdLst>
   <p:sldSz cx="12192000" cy="6858000"/>
   <p:notesSz cx="6858000" cy="9144000"/>
@@ -106,6 +138,11 @@
       </a:defRPr>
     </a:lvl9pPr>
   </p:defaultTextStyle>
+  <p:extLst>
+    <p:ext uri="{EFAFB233-063F-42B5-8137-9DF3F51BA10A}">
+      <p15:sldGuideLst xmlns:p15="http://schemas.microsoft.com/office/powerpoint/2012/main"/>
+    </p:ext>
+  </p:extLst>
 </p:presentation>
 </file>
 
@@ -154,7 +191,6 @@
               <a:rPr lang="en-US"/>
               <a:t>Click to edit Master title style</a:t>
             </a:r>
-            <a:endParaRPr lang="en-US"/>
           </a:p>
         </p:txBody>
       </p:sp>
@@ -219,7 +255,6 @@
               <a:rPr lang="en-US"/>
               <a:t>Click to edit Master subtitle style</a:t>
             </a:r>
-            <a:endParaRPr lang="en-US"/>
           </a:p>
         </p:txBody>
       </p:sp>
@@ -240,7 +275,7 @@
           <a:p>
             <a:fld id="{B17AFAAB-B546-45EA-83F1-D6961F00B077}" type="datetimeFigureOut">
               <a:rPr lang="en-US" smtClean="0"/>
-              <a:t>12/3/2016</a:t>
+              <a:t>12/4/2016</a:t>
             </a:fld>
             <a:endParaRPr lang="en-US"/>
           </a:p>
@@ -337,7 +372,6 @@
               <a:rPr lang="en-US"/>
               <a:t>Click to edit Master title style</a:t>
             </a:r>
-            <a:endParaRPr lang="en-US"/>
           </a:p>
         </p:txBody>
       </p:sp>
@@ -389,7 +423,6 @@
               <a:rPr lang="en-US"/>
               <a:t>Fifth level</a:t>
             </a:r>
-            <a:endParaRPr lang="en-US"/>
           </a:p>
         </p:txBody>
       </p:sp>
@@ -410,7 +443,7 @@
           <a:p>
             <a:fld id="{B17AFAAB-B546-45EA-83F1-D6961F00B077}" type="datetimeFigureOut">
               <a:rPr lang="en-US" smtClean="0"/>
-              <a:t>12/3/2016</a:t>
+              <a:t>12/4/2016</a:t>
             </a:fld>
             <a:endParaRPr lang="en-US"/>
           </a:p>
@@ -512,7 +545,6 @@
               <a:rPr lang="en-US"/>
               <a:t>Click to edit Master title style</a:t>
             </a:r>
-            <a:endParaRPr lang="en-US"/>
           </a:p>
         </p:txBody>
       </p:sp>
@@ -569,7 +601,6 @@
               <a:rPr lang="en-US"/>
               <a:t>Fifth level</a:t>
             </a:r>
-            <a:endParaRPr lang="en-US"/>
           </a:p>
         </p:txBody>
       </p:sp>
@@ -590,7 +621,7 @@
           <a:p>
             <a:fld id="{B17AFAAB-B546-45EA-83F1-D6961F00B077}" type="datetimeFigureOut">
               <a:rPr lang="en-US" smtClean="0"/>
-              <a:t>12/3/2016</a:t>
+              <a:t>12/4/2016</a:t>
             </a:fld>
             <a:endParaRPr lang="en-US"/>
           </a:p>
@@ -687,7 +718,6 @@
               <a:rPr lang="en-US"/>
               <a:t>Click to edit Master title style</a:t>
             </a:r>
-            <a:endParaRPr lang="en-US"/>
           </a:p>
         </p:txBody>
       </p:sp>
@@ -739,7 +769,6 @@
               <a:rPr lang="en-US"/>
               <a:t>Fifth level</a:t>
             </a:r>
-            <a:endParaRPr lang="en-US"/>
           </a:p>
         </p:txBody>
       </p:sp>
@@ -760,7 +789,7 @@
           <a:p>
             <a:fld id="{B17AFAAB-B546-45EA-83F1-D6961F00B077}" type="datetimeFigureOut">
               <a:rPr lang="en-US" smtClean="0"/>
-              <a:t>12/3/2016</a:t>
+              <a:t>12/4/2016</a:t>
             </a:fld>
             <a:endParaRPr lang="en-US"/>
           </a:p>
@@ -866,7 +895,6 @@
               <a:rPr lang="en-US"/>
               <a:t>Click to edit Master title style</a:t>
             </a:r>
-            <a:endParaRPr lang="en-US"/>
           </a:p>
         </p:txBody>
       </p:sp>
@@ -1006,7 +1034,7 @@
           <a:p>
             <a:fld id="{B17AFAAB-B546-45EA-83F1-D6961F00B077}" type="datetimeFigureOut">
               <a:rPr lang="en-US" smtClean="0"/>
-              <a:t>12/3/2016</a:t>
+              <a:t>12/4/2016</a:t>
             </a:fld>
             <a:endParaRPr lang="en-US"/>
           </a:p>
@@ -1103,7 +1131,6 @@
               <a:rPr lang="en-US"/>
               <a:t>Click to edit Master title style</a:t>
             </a:r>
-            <a:endParaRPr lang="en-US"/>
           </a:p>
         </p:txBody>
       </p:sp>
@@ -1160,7 +1187,6 @@
               <a:rPr lang="en-US"/>
               <a:t>Fifth level</a:t>
             </a:r>
-            <a:endParaRPr lang="en-US"/>
           </a:p>
         </p:txBody>
       </p:sp>
@@ -1217,7 +1243,6 @@
               <a:rPr lang="en-US"/>
               <a:t>Fifth level</a:t>
             </a:r>
-            <a:endParaRPr lang="en-US"/>
           </a:p>
         </p:txBody>
       </p:sp>
@@ -1238,7 +1263,7 @@
           <a:p>
             <a:fld id="{B17AFAAB-B546-45EA-83F1-D6961F00B077}" type="datetimeFigureOut">
               <a:rPr lang="en-US" smtClean="0"/>
-              <a:t>12/3/2016</a:t>
+              <a:t>12/4/2016</a:t>
             </a:fld>
             <a:endParaRPr lang="en-US"/>
           </a:p>
@@ -1340,7 +1365,6 @@
               <a:rPr lang="en-US"/>
               <a:t>Click to edit Master title style</a:t>
             </a:r>
-            <a:endParaRPr lang="en-US"/>
           </a:p>
         </p:txBody>
       </p:sp>
@@ -1462,7 +1486,6 @@
               <a:rPr lang="en-US"/>
               <a:t>Fifth level</a:t>
             </a:r>
-            <a:endParaRPr lang="en-US"/>
           </a:p>
         </p:txBody>
       </p:sp>
@@ -1584,7 +1607,6 @@
               <a:rPr lang="en-US"/>
               <a:t>Fifth level</a:t>
             </a:r>
-            <a:endParaRPr lang="en-US"/>
           </a:p>
         </p:txBody>
       </p:sp>
@@ -1605,7 +1627,7 @@
           <a:p>
             <a:fld id="{B17AFAAB-B546-45EA-83F1-D6961F00B077}" type="datetimeFigureOut">
               <a:rPr lang="en-US" smtClean="0"/>
-              <a:t>12/3/2016</a:t>
+              <a:t>12/4/2016</a:t>
             </a:fld>
             <a:endParaRPr lang="en-US"/>
           </a:p>
@@ -1702,7 +1724,6 @@
               <a:rPr lang="en-US"/>
               <a:t>Click to edit Master title style</a:t>
             </a:r>
-            <a:endParaRPr lang="en-US"/>
           </a:p>
         </p:txBody>
       </p:sp>
@@ -1723,7 +1744,7 @@
           <a:p>
             <a:fld id="{B17AFAAB-B546-45EA-83F1-D6961F00B077}" type="datetimeFigureOut">
               <a:rPr lang="en-US" smtClean="0"/>
-              <a:t>12/3/2016</a:t>
+              <a:t>12/4/2016</a:t>
             </a:fld>
             <a:endParaRPr lang="en-US"/>
           </a:p>
@@ -1818,7 +1839,7 @@
           <a:p>
             <a:fld id="{B17AFAAB-B546-45EA-83F1-D6961F00B077}" type="datetimeFigureOut">
               <a:rPr lang="en-US" smtClean="0"/>
-              <a:t>12/3/2016</a:t>
+              <a:t>12/4/2016</a:t>
             </a:fld>
             <a:endParaRPr lang="en-US"/>
           </a:p>
@@ -1924,7 +1945,6 @@
               <a:rPr lang="en-US"/>
               <a:t>Click to edit Master title style</a:t>
             </a:r>
-            <a:endParaRPr lang="en-US"/>
           </a:p>
         </p:txBody>
       </p:sp>
@@ -2009,7 +2029,6 @@
               <a:rPr lang="en-US"/>
               <a:t>Fifth level</a:t>
             </a:r>
-            <a:endParaRPr lang="en-US"/>
           </a:p>
         </p:txBody>
       </p:sp>
@@ -2095,7 +2114,7 @@
           <a:p>
             <a:fld id="{B17AFAAB-B546-45EA-83F1-D6961F00B077}" type="datetimeFigureOut">
               <a:rPr lang="en-US" smtClean="0"/>
-              <a:t>12/3/2016</a:t>
+              <a:t>12/4/2016</a:t>
             </a:fld>
             <a:endParaRPr lang="en-US"/>
           </a:p>
@@ -2201,7 +2220,6 @@
               <a:rPr lang="en-US"/>
               <a:t>Click to edit Master title style</a:t>
             </a:r>
-            <a:endParaRPr lang="en-US"/>
           </a:p>
         </p:txBody>
       </p:sp>
@@ -2348,7 +2366,7 @@
           <a:p>
             <a:fld id="{B17AFAAB-B546-45EA-83F1-D6961F00B077}" type="datetimeFigureOut">
               <a:rPr lang="en-US" smtClean="0"/>
-              <a:t>12/3/2016</a:t>
+              <a:t>12/4/2016</a:t>
             </a:fld>
             <a:endParaRPr lang="en-US"/>
           </a:p>
@@ -2460,7 +2478,6 @@
               <a:rPr lang="en-US"/>
               <a:t>Click to edit Master title style</a:t>
             </a:r>
-            <a:endParaRPr lang="en-US"/>
           </a:p>
         </p:txBody>
       </p:sp>
@@ -2522,7 +2539,6 @@
               <a:rPr lang="en-US"/>
               <a:t>Fifth level</a:t>
             </a:r>
-            <a:endParaRPr lang="en-US"/>
           </a:p>
         </p:txBody>
       </p:sp>
@@ -2561,7 +2577,7 @@
           <a:p>
             <a:fld id="{B17AFAAB-B546-45EA-83F1-D6961F00B077}" type="datetimeFigureOut">
               <a:rPr lang="en-US" smtClean="0"/>
-              <a:t>12/3/2016</a:t>
+              <a:t>12/4/2016</a:t>
             </a:fld>
             <a:endParaRPr lang="en-US"/>
           </a:p>
@@ -3045,6 +3061,1127 @@
 </p:sld>
 </file>
 
+<file path=ppt/slides/slide10.xml><?xml version="1.0" encoding="utf-8"?>
+<p:sld xmlns:a="http://schemas.openxmlformats.org/drawingml/2006/main" xmlns:r="http://schemas.openxmlformats.org/officeDocument/2006/relationships" xmlns:p="http://schemas.openxmlformats.org/presentationml/2006/main">
+  <p:cSld>
+    <p:spTree>
+      <p:nvGrpSpPr>
+        <p:cNvPr id="1" name=""/>
+        <p:cNvGrpSpPr/>
+        <p:nvPr/>
+      </p:nvGrpSpPr>
+      <p:grpSpPr>
+        <a:xfrm>
+          <a:off x="0" y="0"/>
+          <a:ext cx="0" cy="0"/>
+          <a:chOff x="0" y="0"/>
+          <a:chExt cx="0" cy="0"/>
+        </a:xfrm>
+      </p:grpSpPr>
+      <p:sp>
+        <p:nvSpPr>
+          <p:cNvPr id="2" name="Title 1"/>
+          <p:cNvSpPr>
+            <a:spLocks noGrp="1"/>
+          </p:cNvSpPr>
+          <p:nvPr>
+            <p:ph type="title"/>
+          </p:nvPr>
+        </p:nvSpPr>
+        <p:spPr/>
+        <p:txBody>
+          <a:bodyPr/>
+          <a:lstStyle/>
+          <a:p>
+            <a:r>
+              <a:rPr lang="en-US" dirty="0"/>
+              <a:t>Data Management Requirements</a:t>
+            </a:r>
+          </a:p>
+        </p:txBody>
+      </p:sp>
+      <p:sp>
+        <p:nvSpPr>
+          <p:cNvPr id="3" name="Content Placeholder 2"/>
+          <p:cNvSpPr>
+            <a:spLocks noGrp="1"/>
+          </p:cNvSpPr>
+          <p:nvPr>
+            <p:ph idx="1"/>
+          </p:nvPr>
+        </p:nvSpPr>
+        <p:spPr/>
+        <p:txBody>
+          <a:bodyPr/>
+          <a:lstStyle/>
+          <a:p>
+            <a:r>
+              <a:rPr lang="en-US" dirty="0"/>
+              <a:t>Users with files in A360 should be able to use in site</a:t>
+            </a:r>
+          </a:p>
+          <a:p>
+            <a:r>
+              <a:rPr lang="en-US" dirty="0"/>
+              <a:t>User gives website permission to use files</a:t>
+            </a:r>
+          </a:p>
+          <a:p>
+            <a:r>
+              <a:rPr lang="en-US" dirty="0"/>
+              <a:t>User can now choose file to view</a:t>
+            </a:r>
+          </a:p>
+        </p:txBody>
+      </p:sp>
+    </p:spTree>
+    <p:extLst>
+      <p:ext uri="{BB962C8B-B14F-4D97-AF65-F5344CB8AC3E}">
+        <p14:creationId xmlns:p14="http://schemas.microsoft.com/office/powerpoint/2010/main" val="4073836856"/>
+      </p:ext>
+    </p:extLst>
+  </p:cSld>
+  <p:clrMapOvr>
+    <a:masterClrMapping/>
+  </p:clrMapOvr>
+</p:sld>
+</file>
+
+<file path=ppt/slides/slide11.xml><?xml version="1.0" encoding="utf-8"?>
+<p:sld xmlns:a="http://schemas.openxmlformats.org/drawingml/2006/main" xmlns:r="http://schemas.openxmlformats.org/officeDocument/2006/relationships" xmlns:p="http://schemas.openxmlformats.org/presentationml/2006/main">
+  <p:cSld>
+    <p:spTree>
+      <p:nvGrpSpPr>
+        <p:cNvPr id="1" name=""/>
+        <p:cNvGrpSpPr/>
+        <p:nvPr/>
+      </p:nvGrpSpPr>
+      <p:grpSpPr>
+        <a:xfrm>
+          <a:off x="0" y="0"/>
+          <a:ext cx="0" cy="0"/>
+          <a:chOff x="0" y="0"/>
+          <a:chExt cx="0" cy="0"/>
+        </a:xfrm>
+      </p:grpSpPr>
+      <p:sp>
+        <p:nvSpPr>
+          <p:cNvPr id="2" name="Title 1"/>
+          <p:cNvSpPr>
+            <a:spLocks noGrp="1"/>
+          </p:cNvSpPr>
+          <p:nvPr>
+            <p:ph type="title"/>
+          </p:nvPr>
+        </p:nvSpPr>
+        <p:spPr/>
+        <p:txBody>
+          <a:bodyPr/>
+          <a:lstStyle/>
+          <a:p>
+            <a:r>
+              <a:rPr lang="en-US" dirty="0"/>
+              <a:t>Viewing VR Requirements</a:t>
+            </a:r>
+          </a:p>
+        </p:txBody>
+      </p:sp>
+      <p:sp>
+        <p:nvSpPr>
+          <p:cNvPr id="3" name="Content Placeholder 2"/>
+          <p:cNvSpPr>
+            <a:spLocks noGrp="1"/>
+          </p:cNvSpPr>
+          <p:nvPr>
+            <p:ph idx="1"/>
+          </p:nvPr>
+        </p:nvSpPr>
+        <p:spPr/>
+        <p:txBody>
+          <a:bodyPr/>
+          <a:lstStyle/>
+          <a:p>
+            <a:r>
+              <a:rPr lang="en-US" dirty="0"/>
+              <a:t>Model is viewable in VR headset (Google Cardboard)</a:t>
+            </a:r>
+          </a:p>
+          <a:p>
+            <a:r>
+              <a:rPr lang="en-US" dirty="0"/>
+              <a:t>High quality/size models will be hard to view</a:t>
+            </a:r>
+          </a:p>
+          <a:p>
+            <a:r>
+              <a:rPr lang="en-US" dirty="0"/>
+              <a:t>Models need some interactivity while user uses VR</a:t>
+            </a:r>
+          </a:p>
+        </p:txBody>
+      </p:sp>
+    </p:spTree>
+    <p:extLst>
+      <p:ext uri="{BB962C8B-B14F-4D97-AF65-F5344CB8AC3E}">
+        <p14:creationId xmlns:p14="http://schemas.microsoft.com/office/powerpoint/2010/main" val="618129479"/>
+      </p:ext>
+    </p:extLst>
+  </p:cSld>
+  <p:clrMapOvr>
+    <a:masterClrMapping/>
+  </p:clrMapOvr>
+</p:sld>
+</file>
+
+<file path=ppt/slides/slide12.xml><?xml version="1.0" encoding="utf-8"?>
+<p:sld xmlns:a="http://schemas.openxmlformats.org/drawingml/2006/main" xmlns:r="http://schemas.openxmlformats.org/officeDocument/2006/relationships" xmlns:p="http://schemas.openxmlformats.org/presentationml/2006/main">
+  <p:cSld>
+    <p:spTree>
+      <p:nvGrpSpPr>
+        <p:cNvPr id="1" name=""/>
+        <p:cNvGrpSpPr/>
+        <p:nvPr/>
+      </p:nvGrpSpPr>
+      <p:grpSpPr>
+        <a:xfrm>
+          <a:off x="0" y="0"/>
+          <a:ext cx="0" cy="0"/>
+          <a:chOff x="0" y="0"/>
+          <a:chExt cx="0" cy="0"/>
+        </a:xfrm>
+      </p:grpSpPr>
+      <p:sp>
+        <p:nvSpPr>
+          <p:cNvPr id="2" name="Title 1"/>
+          <p:cNvSpPr>
+            <a:spLocks noGrp="1"/>
+          </p:cNvSpPr>
+          <p:nvPr>
+            <p:ph type="title"/>
+          </p:nvPr>
+        </p:nvSpPr>
+        <p:spPr/>
+        <p:txBody>
+          <a:bodyPr/>
+          <a:lstStyle/>
+          <a:p>
+            <a:r>
+              <a:rPr lang="en-US" dirty="0"/>
+              <a:t>Model View Requirements</a:t>
+            </a:r>
+          </a:p>
+        </p:txBody>
+      </p:sp>
+      <p:sp>
+        <p:nvSpPr>
+          <p:cNvPr id="3" name="Content Placeholder 2"/>
+          <p:cNvSpPr>
+            <a:spLocks noGrp="1"/>
+          </p:cNvSpPr>
+          <p:nvPr>
+            <p:ph idx="1"/>
+          </p:nvPr>
+        </p:nvSpPr>
+        <p:spPr/>
+        <p:txBody>
+          <a:bodyPr/>
+          <a:lstStyle/>
+          <a:p>
+            <a:r>
+              <a:rPr lang="en-US" dirty="0"/>
+              <a:t>User can see chosen model on website</a:t>
+            </a:r>
+          </a:p>
+          <a:p>
+            <a:r>
+              <a:rPr lang="en-US" dirty="0"/>
+              <a:t>Model cannot be too detailed or large</a:t>
+            </a:r>
+          </a:p>
+          <a:p>
+            <a:pPr lvl="1"/>
+            <a:r>
+              <a:rPr lang="en-US" dirty="0"/>
+              <a:t>Where the website cannot run it</a:t>
+            </a:r>
+          </a:p>
+          <a:p>
+            <a:r>
+              <a:rPr lang="en-US" dirty="0"/>
+              <a:t>Model is displayed in Forge Viewer and is interactive</a:t>
+            </a:r>
+          </a:p>
+        </p:txBody>
+      </p:sp>
+    </p:spTree>
+    <p:extLst>
+      <p:ext uri="{BB962C8B-B14F-4D97-AF65-F5344CB8AC3E}">
+        <p14:creationId xmlns:p14="http://schemas.microsoft.com/office/powerpoint/2010/main" val="181090165"/>
+      </p:ext>
+    </p:extLst>
+  </p:cSld>
+  <p:clrMapOvr>
+    <a:masterClrMapping/>
+  </p:clrMapOvr>
+</p:sld>
+</file>
+
+<file path=ppt/slides/slide13.xml><?xml version="1.0" encoding="utf-8"?>
+<p:sld xmlns:a="http://schemas.openxmlformats.org/drawingml/2006/main" xmlns:r="http://schemas.openxmlformats.org/officeDocument/2006/relationships" xmlns:p="http://schemas.openxmlformats.org/presentationml/2006/main">
+  <p:cSld>
+    <p:spTree>
+      <p:nvGrpSpPr>
+        <p:cNvPr id="1" name=""/>
+        <p:cNvGrpSpPr/>
+        <p:nvPr/>
+      </p:nvGrpSpPr>
+      <p:grpSpPr>
+        <a:xfrm>
+          <a:off x="0" y="0"/>
+          <a:ext cx="0" cy="0"/>
+          <a:chOff x="0" y="0"/>
+          <a:chExt cx="0" cy="0"/>
+        </a:xfrm>
+      </p:grpSpPr>
+      <p:sp>
+        <p:nvSpPr>
+          <p:cNvPr id="2" name="Title 1"/>
+          <p:cNvSpPr>
+            <a:spLocks noGrp="1"/>
+          </p:cNvSpPr>
+          <p:nvPr>
+            <p:ph type="title"/>
+          </p:nvPr>
+        </p:nvSpPr>
+        <p:spPr/>
+        <p:txBody>
+          <a:bodyPr/>
+          <a:lstStyle/>
+          <a:p>
+            <a:r>
+              <a:rPr lang="en-US" dirty="0"/>
+              <a:t>Model Derivative Requirements</a:t>
+            </a:r>
+          </a:p>
+        </p:txBody>
+      </p:sp>
+      <p:sp>
+        <p:nvSpPr>
+          <p:cNvPr id="3" name="Content Placeholder 2"/>
+          <p:cNvSpPr>
+            <a:spLocks noGrp="1"/>
+          </p:cNvSpPr>
+          <p:nvPr>
+            <p:ph idx="1"/>
+          </p:nvPr>
+        </p:nvSpPr>
+        <p:spPr/>
+        <p:txBody>
+          <a:bodyPr/>
+          <a:lstStyle/>
+          <a:p>
+            <a:r>
+              <a:rPr lang="en-US" dirty="0"/>
+              <a:t>Files user uploads will be converted to SVF files</a:t>
+            </a:r>
+          </a:p>
+          <a:p>
+            <a:r>
+              <a:rPr lang="en-US" dirty="0"/>
+              <a:t>Then the file will be displayed on viewer</a:t>
+            </a:r>
+          </a:p>
+          <a:p>
+            <a:r>
+              <a:rPr lang="en-US" dirty="0"/>
+              <a:t>Should notify user of any failures</a:t>
+            </a:r>
+          </a:p>
+        </p:txBody>
+      </p:sp>
+    </p:spTree>
+    <p:extLst>
+      <p:ext uri="{BB962C8B-B14F-4D97-AF65-F5344CB8AC3E}">
+        <p14:creationId xmlns:p14="http://schemas.microsoft.com/office/powerpoint/2010/main" val="4239687670"/>
+      </p:ext>
+    </p:extLst>
+  </p:cSld>
+  <p:clrMapOvr>
+    <a:masterClrMapping/>
+  </p:clrMapOvr>
+</p:sld>
+</file>
+
+<file path=ppt/slides/slide14.xml><?xml version="1.0" encoding="utf-8"?>
+<p:sld xmlns:a="http://schemas.openxmlformats.org/drawingml/2006/main" xmlns:r="http://schemas.openxmlformats.org/officeDocument/2006/relationships" xmlns:p="http://schemas.openxmlformats.org/presentationml/2006/main">
+  <p:cSld>
+    <p:spTree>
+      <p:nvGrpSpPr>
+        <p:cNvPr id="1" name=""/>
+        <p:cNvGrpSpPr/>
+        <p:nvPr/>
+      </p:nvGrpSpPr>
+      <p:grpSpPr>
+        <a:xfrm>
+          <a:off x="0" y="0"/>
+          <a:ext cx="0" cy="0"/>
+          <a:chOff x="0" y="0"/>
+          <a:chExt cx="0" cy="0"/>
+        </a:xfrm>
+      </p:grpSpPr>
+      <p:sp>
+        <p:nvSpPr>
+          <p:cNvPr id="2" name="Title 1"/>
+          <p:cNvSpPr>
+            <a:spLocks noGrp="1"/>
+          </p:cNvSpPr>
+          <p:nvPr>
+            <p:ph type="title"/>
+          </p:nvPr>
+        </p:nvSpPr>
+        <p:spPr/>
+        <p:txBody>
+          <a:bodyPr/>
+          <a:lstStyle/>
+          <a:p>
+            <a:r>
+              <a:rPr lang="en-US" dirty="0"/>
+              <a:t>File Upload Requirements</a:t>
+            </a:r>
+          </a:p>
+        </p:txBody>
+      </p:sp>
+      <p:sp>
+        <p:nvSpPr>
+          <p:cNvPr id="3" name="Content Placeholder 2"/>
+          <p:cNvSpPr>
+            <a:spLocks noGrp="1"/>
+          </p:cNvSpPr>
+          <p:nvPr>
+            <p:ph idx="1"/>
+          </p:nvPr>
+        </p:nvSpPr>
+        <p:spPr/>
+        <p:txBody>
+          <a:bodyPr/>
+          <a:lstStyle/>
+          <a:p>
+            <a:r>
+              <a:rPr lang="en-US" dirty="0"/>
+              <a:t>User can upload files</a:t>
+            </a:r>
+          </a:p>
+          <a:p>
+            <a:pPr lvl="1"/>
+            <a:r>
+              <a:rPr lang="en-US" dirty="0"/>
+              <a:t>Through local machine</a:t>
+            </a:r>
+          </a:p>
+          <a:p>
+            <a:pPr lvl="1"/>
+            <a:r>
+              <a:rPr lang="en-US" dirty="0"/>
+              <a:t>Or A360 (Data Management API)</a:t>
+            </a:r>
+          </a:p>
+          <a:p>
+            <a:r>
+              <a:rPr lang="en-US" dirty="0"/>
+              <a:t>Failures will be reported</a:t>
+            </a:r>
+          </a:p>
+          <a:p>
+            <a:pPr lvl="1"/>
+            <a:r>
+              <a:rPr lang="en-US" dirty="0"/>
+              <a:t>Unsuccessful upload</a:t>
+            </a:r>
+          </a:p>
+          <a:p>
+            <a:pPr lvl="1"/>
+            <a:r>
+              <a:rPr lang="en-US" dirty="0"/>
+              <a:t>Too large</a:t>
+            </a:r>
+          </a:p>
+          <a:p>
+            <a:r>
+              <a:rPr lang="en-US" dirty="0"/>
+              <a:t>File will be displayed on list of usable models</a:t>
+            </a:r>
+          </a:p>
+        </p:txBody>
+      </p:sp>
+    </p:spTree>
+    <p:extLst>
+      <p:ext uri="{BB962C8B-B14F-4D97-AF65-F5344CB8AC3E}">
+        <p14:creationId xmlns:p14="http://schemas.microsoft.com/office/powerpoint/2010/main" val="4186160874"/>
+      </p:ext>
+    </p:extLst>
+  </p:cSld>
+  <p:clrMapOvr>
+    <a:masterClrMapping/>
+  </p:clrMapOvr>
+</p:sld>
+</file>
+
+<file path=ppt/slides/slide15.xml><?xml version="1.0" encoding="utf-8"?>
+<p:sld xmlns:a="http://schemas.openxmlformats.org/drawingml/2006/main" xmlns:r="http://schemas.openxmlformats.org/officeDocument/2006/relationships" xmlns:p="http://schemas.openxmlformats.org/presentationml/2006/main">
+  <p:cSld>
+    <p:spTree>
+      <p:nvGrpSpPr>
+        <p:cNvPr id="1" name=""/>
+        <p:cNvGrpSpPr/>
+        <p:nvPr/>
+      </p:nvGrpSpPr>
+      <p:grpSpPr>
+        <a:xfrm>
+          <a:off x="0" y="0"/>
+          <a:ext cx="0" cy="0"/>
+          <a:chOff x="0" y="0"/>
+          <a:chExt cx="0" cy="0"/>
+        </a:xfrm>
+      </p:grpSpPr>
+      <p:sp>
+        <p:nvSpPr>
+          <p:cNvPr id="2" name="Title 1"/>
+          <p:cNvSpPr>
+            <a:spLocks noGrp="1"/>
+          </p:cNvSpPr>
+          <p:nvPr>
+            <p:ph type="title"/>
+          </p:nvPr>
+        </p:nvSpPr>
+        <p:spPr/>
+        <p:txBody>
+          <a:bodyPr/>
+          <a:lstStyle/>
+          <a:p>
+            <a:r>
+              <a:rPr lang="en-US" dirty="0"/>
+              <a:t>Smartphone Connection Requirements</a:t>
+            </a:r>
+          </a:p>
+        </p:txBody>
+      </p:sp>
+      <p:sp>
+        <p:nvSpPr>
+          <p:cNvPr id="3" name="Content Placeholder 2"/>
+          <p:cNvSpPr>
+            <a:spLocks noGrp="1"/>
+          </p:cNvSpPr>
+          <p:nvPr>
+            <p:ph idx="1"/>
+          </p:nvPr>
+        </p:nvSpPr>
+        <p:spPr/>
+        <p:txBody>
+          <a:bodyPr/>
+          <a:lstStyle/>
+          <a:p>
+            <a:r>
+              <a:rPr lang="en-US" dirty="0"/>
+              <a:t>Users connect phone to Vrok.it</a:t>
+            </a:r>
+          </a:p>
+          <a:p>
+            <a:r>
+              <a:rPr lang="en-US" dirty="0"/>
+              <a:t>So user can view model in VR environment</a:t>
+            </a:r>
+          </a:p>
+          <a:p>
+            <a:r>
+              <a:rPr lang="en-US" dirty="0"/>
+              <a:t>Users device must have QR scanner and internet</a:t>
+            </a:r>
+          </a:p>
+          <a:p>
+            <a:r>
+              <a:rPr lang="en-US" dirty="0"/>
+              <a:t>Phone should connect to site via QR scan</a:t>
+            </a:r>
+          </a:p>
+          <a:p>
+            <a:endParaRPr lang="en-US" dirty="0"/>
+          </a:p>
+        </p:txBody>
+      </p:sp>
+    </p:spTree>
+    <p:extLst>
+      <p:ext uri="{BB962C8B-B14F-4D97-AF65-F5344CB8AC3E}">
+        <p14:creationId xmlns:p14="http://schemas.microsoft.com/office/powerpoint/2010/main" val="1717661036"/>
+      </p:ext>
+    </p:extLst>
+  </p:cSld>
+  <p:clrMapOvr>
+    <a:masterClrMapping/>
+  </p:clrMapOvr>
+</p:sld>
+</file>
+
+<file path=ppt/slides/slide16.xml><?xml version="1.0" encoding="utf-8"?>
+<p:sld xmlns:a="http://schemas.openxmlformats.org/drawingml/2006/main" xmlns:r="http://schemas.openxmlformats.org/officeDocument/2006/relationships" xmlns:p="http://schemas.openxmlformats.org/presentationml/2006/main">
+  <p:cSld>
+    <p:spTree>
+      <p:nvGrpSpPr>
+        <p:cNvPr id="1" name=""/>
+        <p:cNvGrpSpPr/>
+        <p:nvPr/>
+      </p:nvGrpSpPr>
+      <p:grpSpPr>
+        <a:xfrm>
+          <a:off x="0" y="0"/>
+          <a:ext cx="0" cy="0"/>
+          <a:chOff x="0" y="0"/>
+          <a:chExt cx="0" cy="0"/>
+        </a:xfrm>
+      </p:grpSpPr>
+      <p:sp>
+        <p:nvSpPr>
+          <p:cNvPr id="2" name="Title 1"/>
+          <p:cNvSpPr>
+            <a:spLocks noGrp="1"/>
+          </p:cNvSpPr>
+          <p:nvPr>
+            <p:ph type="title"/>
+          </p:nvPr>
+        </p:nvSpPr>
+        <p:spPr/>
+        <p:txBody>
+          <a:bodyPr/>
+          <a:lstStyle/>
+          <a:p>
+            <a:r>
+              <a:rPr lang="en-US" dirty="0"/>
+              <a:t>Authentication Design</a:t>
+            </a:r>
+            <a:endParaRPr lang="en-US" dirty="0"/>
+          </a:p>
+        </p:txBody>
+      </p:sp>
+      <p:sp>
+        <p:nvSpPr>
+          <p:cNvPr id="3" name="Text Placeholder 2"/>
+          <p:cNvSpPr>
+            <a:spLocks noGrp="1"/>
+          </p:cNvSpPr>
+          <p:nvPr>
+            <p:ph type="body" idx="1"/>
+          </p:nvPr>
+        </p:nvSpPr>
+        <p:spPr>
+          <a:xfrm>
+            <a:off x="839788" y="1681163"/>
+            <a:ext cx="5157787" cy="484521"/>
+          </a:xfrm>
+        </p:spPr>
+        <p:txBody>
+          <a:bodyPr/>
+          <a:lstStyle/>
+          <a:p>
+            <a:r>
+              <a:rPr lang="en-US" dirty="0"/>
+              <a:t>2 Legged</a:t>
+            </a:r>
+          </a:p>
+        </p:txBody>
+      </p:sp>
+      <p:sp>
+        <p:nvSpPr>
+          <p:cNvPr id="4" name="Content Placeholder 3"/>
+          <p:cNvSpPr>
+            <a:spLocks noGrp="1"/>
+          </p:cNvSpPr>
+          <p:nvPr>
+            <p:ph sz="half" idx="2"/>
+          </p:nvPr>
+        </p:nvSpPr>
+        <p:spPr>
+          <a:xfrm>
+            <a:off x="839788" y="2165684"/>
+            <a:ext cx="5157787" cy="4023979"/>
+          </a:xfrm>
+        </p:spPr>
+        <p:txBody>
+          <a:bodyPr/>
+          <a:lstStyle/>
+          <a:p>
+            <a:r>
+              <a:rPr lang="en-US" dirty="0"/>
+              <a:t>For when site does not need permission based resources</a:t>
+            </a:r>
+          </a:p>
+          <a:p>
+            <a:r>
+              <a:rPr lang="en-US" dirty="0"/>
+              <a:t>Simple token exchange system for security</a:t>
+            </a:r>
+          </a:p>
+          <a:p>
+            <a:r>
+              <a:rPr lang="en-US" dirty="0"/>
+              <a:t>Dependent on Autodesk endpoints/system/servers</a:t>
+            </a:r>
+          </a:p>
+        </p:txBody>
+      </p:sp>
+      <p:sp>
+        <p:nvSpPr>
+          <p:cNvPr id="5" name="Text Placeholder 4"/>
+          <p:cNvSpPr>
+            <a:spLocks noGrp="1"/>
+          </p:cNvSpPr>
+          <p:nvPr>
+            <p:ph type="body" sz="quarter" idx="3"/>
+          </p:nvPr>
+        </p:nvSpPr>
+        <p:spPr>
+          <a:xfrm>
+            <a:off x="6172200" y="1681163"/>
+            <a:ext cx="5183188" cy="484521"/>
+          </a:xfrm>
+        </p:spPr>
+        <p:txBody>
+          <a:bodyPr/>
+          <a:lstStyle/>
+          <a:p>
+            <a:r>
+              <a:rPr lang="en-US" dirty="0"/>
+              <a:t>3 Legged</a:t>
+            </a:r>
+          </a:p>
+        </p:txBody>
+      </p:sp>
+      <p:sp>
+        <p:nvSpPr>
+          <p:cNvPr id="6" name="Content Placeholder 5"/>
+          <p:cNvSpPr>
+            <a:spLocks noGrp="1"/>
+          </p:cNvSpPr>
+          <p:nvPr>
+            <p:ph sz="quarter" idx="4"/>
+          </p:nvPr>
+        </p:nvSpPr>
+        <p:spPr>
+          <a:xfrm>
+            <a:off x="6172200" y="2165684"/>
+            <a:ext cx="5183188" cy="4023979"/>
+          </a:xfrm>
+        </p:spPr>
+        <p:txBody>
+          <a:bodyPr/>
+          <a:lstStyle/>
+          <a:p>
+            <a:r>
+              <a:rPr lang="en-US" dirty="0"/>
+              <a:t>When users must verify permission for resources</a:t>
+            </a:r>
+          </a:p>
+          <a:p>
+            <a:r>
+              <a:rPr lang="en-US" dirty="0"/>
+              <a:t>Users verify permission after logging in</a:t>
+            </a:r>
+          </a:p>
+          <a:p>
+            <a:r>
+              <a:rPr lang="en-US" dirty="0"/>
+              <a:t>Token returned granting site access of resources</a:t>
+            </a:r>
+          </a:p>
+          <a:p>
+            <a:r>
+              <a:rPr lang="en-US" dirty="0"/>
+              <a:t>Dependent on Autodesk endpoints/system/servers</a:t>
+            </a:r>
+          </a:p>
+          <a:p>
+            <a:pPr lvl="1"/>
+            <a:r>
+              <a:rPr lang="en-US" dirty="0"/>
+              <a:t>As well as user permission</a:t>
+            </a:r>
+          </a:p>
+          <a:p>
+            <a:endParaRPr lang="en-US" dirty="0"/>
+          </a:p>
+        </p:txBody>
+      </p:sp>
+    </p:spTree>
+    <p:extLst>
+      <p:ext uri="{BB962C8B-B14F-4D97-AF65-F5344CB8AC3E}">
+        <p14:creationId xmlns:p14="http://schemas.microsoft.com/office/powerpoint/2010/main" val="2497763136"/>
+      </p:ext>
+    </p:extLst>
+  </p:cSld>
+  <p:clrMapOvr>
+    <a:masterClrMapping/>
+  </p:clrMapOvr>
+</p:sld>
+</file>
+
+<file path=ppt/slides/slide17.xml><?xml version="1.0" encoding="utf-8"?>
+<p:sld xmlns:a="http://schemas.openxmlformats.org/drawingml/2006/main" xmlns:r="http://schemas.openxmlformats.org/officeDocument/2006/relationships" xmlns:p="http://schemas.openxmlformats.org/presentationml/2006/main">
+  <p:cSld>
+    <p:spTree>
+      <p:nvGrpSpPr>
+        <p:cNvPr id="1" name=""/>
+        <p:cNvGrpSpPr/>
+        <p:nvPr/>
+      </p:nvGrpSpPr>
+      <p:grpSpPr>
+        <a:xfrm>
+          <a:off x="0" y="0"/>
+          <a:ext cx="0" cy="0"/>
+          <a:chOff x="0" y="0"/>
+          <a:chExt cx="0" cy="0"/>
+        </a:xfrm>
+      </p:grpSpPr>
+      <p:sp>
+        <p:nvSpPr>
+          <p:cNvPr id="2" name="Title 1"/>
+          <p:cNvSpPr>
+            <a:spLocks noGrp="1"/>
+          </p:cNvSpPr>
+          <p:nvPr>
+            <p:ph type="title"/>
+          </p:nvPr>
+        </p:nvSpPr>
+        <p:spPr/>
+        <p:txBody>
+          <a:bodyPr/>
+          <a:lstStyle/>
+          <a:p>
+            <a:r>
+              <a:rPr lang="en-US" dirty="0"/>
+              <a:t>Data Management Design</a:t>
+            </a:r>
+          </a:p>
+        </p:txBody>
+      </p:sp>
+      <p:sp>
+        <p:nvSpPr>
+          <p:cNvPr id="3" name="Content Placeholder 2"/>
+          <p:cNvSpPr>
+            <a:spLocks noGrp="1"/>
+          </p:cNvSpPr>
+          <p:nvPr>
+            <p:ph idx="1"/>
+          </p:nvPr>
+        </p:nvSpPr>
+        <p:spPr/>
+        <p:txBody>
+          <a:bodyPr/>
+          <a:lstStyle/>
+          <a:p>
+            <a:r>
+              <a:rPr lang="en-US" dirty="0"/>
+              <a:t>Relies on 3 Legged Data Authentication being completed</a:t>
+            </a:r>
+          </a:p>
+          <a:p>
+            <a:r>
+              <a:rPr lang="en-US" dirty="0"/>
+              <a:t>User accesses files stored in A360 to use</a:t>
+            </a:r>
+          </a:p>
+          <a:p>
+            <a:r>
+              <a:rPr lang="en-US" dirty="0"/>
+              <a:t>Data management returns those files</a:t>
+            </a:r>
+          </a:p>
+        </p:txBody>
+      </p:sp>
+    </p:spTree>
+    <p:extLst>
+      <p:ext uri="{BB962C8B-B14F-4D97-AF65-F5344CB8AC3E}">
+        <p14:creationId xmlns:p14="http://schemas.microsoft.com/office/powerpoint/2010/main" val="1095674573"/>
+      </p:ext>
+    </p:extLst>
+  </p:cSld>
+  <p:clrMapOvr>
+    <a:masterClrMapping/>
+  </p:clrMapOvr>
+</p:sld>
+</file>
+
+<file path=ppt/slides/slide18.xml><?xml version="1.0" encoding="utf-8"?>
+<p:sld xmlns:a="http://schemas.openxmlformats.org/drawingml/2006/main" xmlns:r="http://schemas.openxmlformats.org/officeDocument/2006/relationships" xmlns:p="http://schemas.openxmlformats.org/presentationml/2006/main">
+  <p:cSld>
+    <p:spTree>
+      <p:nvGrpSpPr>
+        <p:cNvPr id="1" name=""/>
+        <p:cNvGrpSpPr/>
+        <p:nvPr/>
+      </p:nvGrpSpPr>
+      <p:grpSpPr>
+        <a:xfrm>
+          <a:off x="0" y="0"/>
+          <a:ext cx="0" cy="0"/>
+          <a:chOff x="0" y="0"/>
+          <a:chExt cx="0" cy="0"/>
+        </a:xfrm>
+      </p:grpSpPr>
+      <p:sp>
+        <p:nvSpPr>
+          <p:cNvPr id="2" name="Title 1"/>
+          <p:cNvSpPr>
+            <a:spLocks noGrp="1"/>
+          </p:cNvSpPr>
+          <p:nvPr>
+            <p:ph type="title"/>
+          </p:nvPr>
+        </p:nvSpPr>
+        <p:spPr/>
+        <p:txBody>
+          <a:bodyPr/>
+          <a:lstStyle/>
+          <a:p>
+            <a:r>
+              <a:rPr lang="en-US" dirty="0"/>
+              <a:t>Viewing VR Design</a:t>
+            </a:r>
+          </a:p>
+        </p:txBody>
+      </p:sp>
+      <p:sp>
+        <p:nvSpPr>
+          <p:cNvPr id="3" name="Content Placeholder 2"/>
+          <p:cNvSpPr>
+            <a:spLocks noGrp="1"/>
+          </p:cNvSpPr>
+          <p:nvPr>
+            <p:ph idx="1"/>
+          </p:nvPr>
+        </p:nvSpPr>
+        <p:spPr/>
+        <p:txBody>
+          <a:bodyPr/>
+          <a:lstStyle/>
+          <a:p>
+            <a:r>
+              <a:rPr lang="en-US" dirty="0"/>
+              <a:t>Currently using Google Cardboard’s application</a:t>
+            </a:r>
+          </a:p>
+          <a:p>
+            <a:pPr lvl="1"/>
+            <a:r>
+              <a:rPr lang="en-US" dirty="0"/>
+              <a:t>Android WebView inside the application (</a:t>
+            </a:r>
+            <a:r>
+              <a:rPr lang="en-US" dirty="0" err="1"/>
+              <a:t>WebGL</a:t>
+            </a:r>
+            <a:r>
+              <a:rPr lang="en-US" dirty="0"/>
+              <a:t>)</a:t>
+            </a:r>
+          </a:p>
+          <a:p>
+            <a:r>
+              <a:rPr lang="en-US" dirty="0"/>
+              <a:t>This allows for VR viewing of models on the site loaded by the QR scanner</a:t>
+            </a:r>
+          </a:p>
+          <a:p>
+            <a:r>
+              <a:rPr lang="en-US" dirty="0"/>
+              <a:t>Dependent on user having</a:t>
+            </a:r>
+          </a:p>
+          <a:p>
+            <a:pPr lvl="1"/>
+            <a:r>
+              <a:rPr lang="en-US" dirty="0"/>
+              <a:t>Google Cardboard hardware </a:t>
+            </a:r>
+          </a:p>
+          <a:p>
+            <a:pPr lvl="1"/>
+            <a:r>
+              <a:rPr lang="en-US" dirty="0"/>
+              <a:t>Google Cardboard application</a:t>
+            </a:r>
+          </a:p>
+          <a:p>
+            <a:pPr lvl="1"/>
+            <a:r>
+              <a:rPr lang="en-US" dirty="0"/>
+              <a:t>Android Device Lollipop+</a:t>
+            </a:r>
+            <a:endParaRPr lang="en-US" dirty="0"/>
+          </a:p>
+        </p:txBody>
+      </p:sp>
+    </p:spTree>
+    <p:extLst>
+      <p:ext uri="{BB962C8B-B14F-4D97-AF65-F5344CB8AC3E}">
+        <p14:creationId xmlns:p14="http://schemas.microsoft.com/office/powerpoint/2010/main" val="1648740225"/>
+      </p:ext>
+    </p:extLst>
+  </p:cSld>
+  <p:clrMapOvr>
+    <a:masterClrMapping/>
+  </p:clrMapOvr>
+</p:sld>
+</file>
+
+<file path=ppt/slides/slide19.xml><?xml version="1.0" encoding="utf-8"?>
+<p:sld xmlns:a="http://schemas.openxmlformats.org/drawingml/2006/main" xmlns:r="http://schemas.openxmlformats.org/officeDocument/2006/relationships" xmlns:p="http://schemas.openxmlformats.org/presentationml/2006/main">
+  <p:cSld>
+    <p:spTree>
+      <p:nvGrpSpPr>
+        <p:cNvPr id="1" name=""/>
+        <p:cNvGrpSpPr/>
+        <p:nvPr/>
+      </p:nvGrpSpPr>
+      <p:grpSpPr>
+        <a:xfrm>
+          <a:off x="0" y="0"/>
+          <a:ext cx="0" cy="0"/>
+          <a:chOff x="0" y="0"/>
+          <a:chExt cx="0" cy="0"/>
+        </a:xfrm>
+      </p:grpSpPr>
+      <p:sp>
+        <p:nvSpPr>
+          <p:cNvPr id="2" name="Title 1"/>
+          <p:cNvSpPr>
+            <a:spLocks noGrp="1"/>
+          </p:cNvSpPr>
+          <p:nvPr>
+            <p:ph type="title"/>
+          </p:nvPr>
+        </p:nvSpPr>
+        <p:spPr/>
+        <p:txBody>
+          <a:bodyPr/>
+          <a:lstStyle/>
+          <a:p>
+            <a:r>
+              <a:rPr lang="en-US" dirty="0"/>
+              <a:t>Website Interface</a:t>
+            </a:r>
+          </a:p>
+        </p:txBody>
+      </p:sp>
+      <p:sp>
+        <p:nvSpPr>
+          <p:cNvPr id="3" name="Content Placeholder 2"/>
+          <p:cNvSpPr>
+            <a:spLocks noGrp="1"/>
+          </p:cNvSpPr>
+          <p:nvPr>
+            <p:ph idx="1"/>
+          </p:nvPr>
+        </p:nvSpPr>
+        <p:spPr/>
+        <p:txBody>
+          <a:bodyPr/>
+          <a:lstStyle/>
+          <a:p>
+            <a:r>
+              <a:rPr lang="en-US" dirty="0"/>
+              <a:t>NEW interface</a:t>
+            </a:r>
+          </a:p>
+          <a:p>
+            <a:r>
+              <a:rPr lang="en-US" dirty="0"/>
+              <a:t>Focus on positive user experience</a:t>
+            </a:r>
+          </a:p>
+          <a:p>
+            <a:r>
+              <a:rPr lang="en-US" dirty="0"/>
+              <a:t>Needs to have:</a:t>
+            </a:r>
+          </a:p>
+          <a:p>
+            <a:pPr lvl="1"/>
+            <a:r>
+              <a:rPr lang="en-US" dirty="0"/>
+              <a:t>Forge Viewer</a:t>
+            </a:r>
+          </a:p>
+          <a:p>
+            <a:pPr lvl="1"/>
+            <a:r>
+              <a:rPr lang="en-US" dirty="0"/>
+              <a:t>File Upload</a:t>
+            </a:r>
+          </a:p>
+          <a:p>
+            <a:pPr lvl="1"/>
+            <a:r>
+              <a:rPr lang="en-US" dirty="0"/>
+              <a:t>QR code</a:t>
+            </a:r>
+          </a:p>
+          <a:p>
+            <a:pPr lvl="1"/>
+            <a:r>
+              <a:rPr lang="en-US" dirty="0"/>
+              <a:t>Model Derivative</a:t>
+            </a:r>
+          </a:p>
+          <a:p>
+            <a:pPr lvl="1"/>
+            <a:r>
+              <a:rPr lang="en-US" dirty="0"/>
+              <a:t>Information and basic site content</a:t>
+            </a:r>
+          </a:p>
+        </p:txBody>
+      </p:sp>
+      <p:pic>
+        <p:nvPicPr>
+          <p:cNvPr id="4" name="Picture 3"/>
+          <p:cNvPicPr>
+            <a:picLocks noChangeAspect="1"/>
+          </p:cNvPicPr>
+          <p:nvPr/>
+        </p:nvPicPr>
+        <p:blipFill>
+          <a:blip r:embed="rId2">
+            <a:extLst>
+              <a:ext uri="{28A0092B-C50C-407E-A947-70E740481C1C}">
+                <a14:useLocalDpi xmlns:a14="http://schemas.microsoft.com/office/drawing/2010/main" val="0"/>
+              </a:ext>
+            </a:extLst>
+          </a:blip>
+          <a:stretch>
+            <a:fillRect/>
+          </a:stretch>
+        </p:blipFill>
+        <p:spPr>
+          <a:xfrm>
+            <a:off x="6096000" y="2217291"/>
+            <a:ext cx="5902941" cy="2756607"/>
+          </a:xfrm>
+          <a:prstGeom prst="rect">
+            <a:avLst/>
+          </a:prstGeom>
+        </p:spPr>
+      </p:pic>
+    </p:spTree>
+    <p:extLst>
+      <p:ext uri="{BB962C8B-B14F-4D97-AF65-F5344CB8AC3E}">
+        <p14:creationId xmlns:p14="http://schemas.microsoft.com/office/powerpoint/2010/main" val="3569504896"/>
+      </p:ext>
+    </p:extLst>
+  </p:cSld>
+  <p:clrMapOvr>
+    <a:masterClrMapping/>
+  </p:clrMapOvr>
+</p:sld>
+</file>
+
 <file path=ppt/slides/slide2.xml><?xml version="1.0" encoding="utf-8"?>
 <p:sld xmlns:a="http://schemas.openxmlformats.org/drawingml/2006/main" xmlns:r="http://schemas.openxmlformats.org/officeDocument/2006/relationships" xmlns:p="http://schemas.openxmlformats.org/presentationml/2006/main">
   <p:cSld>
@@ -3140,6 +4277,1173 @@
     <p:extLst>
       <p:ext uri="{BB962C8B-B14F-4D97-AF65-F5344CB8AC3E}">
         <p14:creationId xmlns:p14="http://schemas.microsoft.com/office/powerpoint/2010/main" val="1265223157"/>
+      </p:ext>
+    </p:extLst>
+  </p:cSld>
+  <p:clrMapOvr>
+    <a:masterClrMapping/>
+  </p:clrMapOvr>
+</p:sld>
+</file>
+
+<file path=ppt/slides/slide20.xml><?xml version="1.0" encoding="utf-8"?>
+<p:sld xmlns:a="http://schemas.openxmlformats.org/drawingml/2006/main" xmlns:r="http://schemas.openxmlformats.org/officeDocument/2006/relationships" xmlns:p="http://schemas.openxmlformats.org/presentationml/2006/main">
+  <p:cSld>
+    <p:spTree>
+      <p:nvGrpSpPr>
+        <p:cNvPr id="1" name=""/>
+        <p:cNvGrpSpPr/>
+        <p:nvPr/>
+      </p:nvGrpSpPr>
+      <p:grpSpPr>
+        <a:xfrm>
+          <a:off x="0" y="0"/>
+          <a:ext cx="0" cy="0"/>
+          <a:chOff x="0" y="0"/>
+          <a:chExt cx="0" cy="0"/>
+        </a:xfrm>
+      </p:grpSpPr>
+      <p:sp>
+        <p:nvSpPr>
+          <p:cNvPr id="2" name="Title 1"/>
+          <p:cNvSpPr>
+            <a:spLocks noGrp="1"/>
+          </p:cNvSpPr>
+          <p:nvPr>
+            <p:ph type="title"/>
+          </p:nvPr>
+        </p:nvSpPr>
+        <p:spPr/>
+        <p:txBody>
+          <a:bodyPr/>
+          <a:lstStyle/>
+          <a:p>
+            <a:r>
+              <a:rPr lang="en-US" dirty="0"/>
+              <a:t>Model View Design</a:t>
+            </a:r>
+          </a:p>
+        </p:txBody>
+      </p:sp>
+      <p:sp>
+        <p:nvSpPr>
+          <p:cNvPr id="3" name="Content Placeholder 2"/>
+          <p:cNvSpPr>
+            <a:spLocks noGrp="1"/>
+          </p:cNvSpPr>
+          <p:nvPr>
+            <p:ph idx="1"/>
+          </p:nvPr>
+        </p:nvSpPr>
+        <p:spPr/>
+        <p:txBody>
+          <a:bodyPr/>
+          <a:lstStyle/>
+          <a:p>
+            <a:r>
+              <a:rPr lang="en-US" dirty="0"/>
+              <a:t>Forge Large Model Viewer</a:t>
+            </a:r>
+          </a:p>
+          <a:p>
+            <a:pPr lvl="1"/>
+            <a:r>
+              <a:rPr lang="en-US" dirty="0"/>
+              <a:t>Uses </a:t>
+            </a:r>
+            <a:r>
+              <a:rPr lang="en-US" dirty="0" err="1"/>
+              <a:t>WebGL</a:t>
+            </a:r>
+            <a:endParaRPr lang="en-US" dirty="0"/>
+          </a:p>
+          <a:p>
+            <a:pPr lvl="1"/>
+            <a:r>
+              <a:rPr lang="en-US" dirty="0"/>
+              <a:t>Renders SVF model on webpage</a:t>
+            </a:r>
+          </a:p>
+          <a:p>
+            <a:r>
+              <a:rPr lang="en-US" dirty="0"/>
+              <a:t>Model is interactive</a:t>
+            </a:r>
+          </a:p>
+          <a:p>
+            <a:r>
+              <a:rPr lang="en-US" dirty="0"/>
+              <a:t>Components</a:t>
+            </a:r>
+          </a:p>
+          <a:p>
+            <a:pPr lvl="1"/>
+            <a:r>
+              <a:rPr lang="en-US" dirty="0"/>
+              <a:t>Main view window</a:t>
+            </a:r>
+          </a:p>
+          <a:p>
+            <a:pPr lvl="1"/>
+            <a:r>
+              <a:rPr lang="en-US" dirty="0"/>
+              <a:t>Listed Models</a:t>
+            </a:r>
+          </a:p>
+          <a:p>
+            <a:pPr lvl="1"/>
+            <a:r>
+              <a:rPr lang="en-US" dirty="0"/>
+              <a:t>Viewer Controls</a:t>
+            </a:r>
+          </a:p>
+          <a:p>
+            <a:pPr lvl="1"/>
+            <a:r>
+              <a:rPr lang="en-US" dirty="0"/>
+              <a:t>Model viewer navigation</a:t>
+            </a:r>
+          </a:p>
+          <a:p>
+            <a:pPr lvl="1"/>
+            <a:r>
+              <a:rPr lang="en-US" dirty="0"/>
+              <a:t>Mobile Viewer</a:t>
+            </a:r>
+          </a:p>
+        </p:txBody>
+      </p:sp>
+    </p:spTree>
+    <p:extLst>
+      <p:ext uri="{BB962C8B-B14F-4D97-AF65-F5344CB8AC3E}">
+        <p14:creationId xmlns:p14="http://schemas.microsoft.com/office/powerpoint/2010/main" val="1887009037"/>
+      </p:ext>
+    </p:extLst>
+  </p:cSld>
+  <p:clrMapOvr>
+    <a:masterClrMapping/>
+  </p:clrMapOvr>
+</p:sld>
+</file>
+
+<file path=ppt/slides/slide21.xml><?xml version="1.0" encoding="utf-8"?>
+<p:sld xmlns:a="http://schemas.openxmlformats.org/drawingml/2006/main" xmlns:r="http://schemas.openxmlformats.org/officeDocument/2006/relationships" xmlns:p="http://schemas.openxmlformats.org/presentationml/2006/main">
+  <p:cSld>
+    <p:spTree>
+      <p:nvGrpSpPr>
+        <p:cNvPr id="1" name=""/>
+        <p:cNvGrpSpPr/>
+        <p:nvPr/>
+      </p:nvGrpSpPr>
+      <p:grpSpPr>
+        <a:xfrm>
+          <a:off x="0" y="0"/>
+          <a:ext cx="0" cy="0"/>
+          <a:chOff x="0" y="0"/>
+          <a:chExt cx="0" cy="0"/>
+        </a:xfrm>
+      </p:grpSpPr>
+      <p:sp>
+        <p:nvSpPr>
+          <p:cNvPr id="2" name="Title 1"/>
+          <p:cNvSpPr>
+            <a:spLocks noGrp="1"/>
+          </p:cNvSpPr>
+          <p:nvPr>
+            <p:ph type="title"/>
+          </p:nvPr>
+        </p:nvSpPr>
+        <p:spPr/>
+        <p:txBody>
+          <a:bodyPr/>
+          <a:lstStyle/>
+          <a:p>
+            <a:r>
+              <a:rPr lang="en-US" dirty="0"/>
+              <a:t>Model Derivative Design (File Conversion)</a:t>
+            </a:r>
+          </a:p>
+        </p:txBody>
+      </p:sp>
+      <p:sp>
+        <p:nvSpPr>
+          <p:cNvPr id="3" name="Content Placeholder 2"/>
+          <p:cNvSpPr>
+            <a:spLocks noGrp="1"/>
+          </p:cNvSpPr>
+          <p:nvPr>
+            <p:ph idx="1"/>
+          </p:nvPr>
+        </p:nvSpPr>
+        <p:spPr/>
+        <p:txBody>
+          <a:bodyPr/>
+          <a:lstStyle/>
+          <a:p>
+            <a:r>
+              <a:rPr lang="en-US" dirty="0"/>
+              <a:t>Uploaded files (local or not) sent </a:t>
+            </a:r>
+          </a:p>
+          <a:p>
+            <a:r>
+              <a:rPr lang="en-US" dirty="0"/>
+              <a:t>API accepts CAD files</a:t>
+            </a:r>
+          </a:p>
+          <a:p>
+            <a:r>
+              <a:rPr lang="en-US" dirty="0"/>
+              <a:t>Failure is notified to user</a:t>
+            </a:r>
+          </a:p>
+          <a:p>
+            <a:r>
+              <a:rPr lang="en-US" dirty="0"/>
+              <a:t>Success results in converted SVF file</a:t>
+            </a:r>
+          </a:p>
+          <a:p>
+            <a:endParaRPr lang="en-US" dirty="0"/>
+          </a:p>
+        </p:txBody>
+      </p:sp>
+    </p:spTree>
+    <p:extLst>
+      <p:ext uri="{BB962C8B-B14F-4D97-AF65-F5344CB8AC3E}">
+        <p14:creationId xmlns:p14="http://schemas.microsoft.com/office/powerpoint/2010/main" val="539222828"/>
+      </p:ext>
+    </p:extLst>
+  </p:cSld>
+  <p:clrMapOvr>
+    <a:masterClrMapping/>
+  </p:clrMapOvr>
+</p:sld>
+</file>
+
+<file path=ppt/slides/slide22.xml><?xml version="1.0" encoding="utf-8"?>
+<p:sld xmlns:a="http://schemas.openxmlformats.org/drawingml/2006/main" xmlns:r="http://schemas.openxmlformats.org/officeDocument/2006/relationships" xmlns:p="http://schemas.openxmlformats.org/presentationml/2006/main">
+  <p:cSld>
+    <p:spTree>
+      <p:nvGrpSpPr>
+        <p:cNvPr id="1" name=""/>
+        <p:cNvGrpSpPr/>
+        <p:nvPr/>
+      </p:nvGrpSpPr>
+      <p:grpSpPr>
+        <a:xfrm>
+          <a:off x="0" y="0"/>
+          <a:ext cx="0" cy="0"/>
+          <a:chOff x="0" y="0"/>
+          <a:chExt cx="0" cy="0"/>
+        </a:xfrm>
+      </p:grpSpPr>
+      <p:sp>
+        <p:nvSpPr>
+          <p:cNvPr id="2" name="Title 1"/>
+          <p:cNvSpPr>
+            <a:spLocks noGrp="1"/>
+          </p:cNvSpPr>
+          <p:nvPr>
+            <p:ph type="title"/>
+          </p:nvPr>
+        </p:nvSpPr>
+        <p:spPr/>
+        <p:txBody>
+          <a:bodyPr/>
+          <a:lstStyle/>
+          <a:p>
+            <a:r>
+              <a:rPr lang="en-US" dirty="0"/>
+              <a:t>Local File Upload Design</a:t>
+            </a:r>
+          </a:p>
+        </p:txBody>
+      </p:sp>
+      <p:sp>
+        <p:nvSpPr>
+          <p:cNvPr id="3" name="Content Placeholder 2"/>
+          <p:cNvSpPr>
+            <a:spLocks noGrp="1"/>
+          </p:cNvSpPr>
+          <p:nvPr>
+            <p:ph idx="1"/>
+          </p:nvPr>
+        </p:nvSpPr>
+        <p:spPr/>
+        <p:txBody>
+          <a:bodyPr/>
+          <a:lstStyle/>
+          <a:p>
+            <a:r>
+              <a:rPr lang="en-US" dirty="0"/>
+              <a:t>Select files on local machine</a:t>
+            </a:r>
+          </a:p>
+          <a:p>
+            <a:pPr lvl="1"/>
+            <a:r>
+              <a:rPr lang="en-US" dirty="0"/>
+              <a:t>Site verifies file type</a:t>
+            </a:r>
+          </a:p>
+          <a:p>
+            <a:pPr lvl="1"/>
+            <a:r>
+              <a:rPr lang="en-US" dirty="0"/>
+              <a:t>Conversion to SVF type</a:t>
+            </a:r>
+          </a:p>
+          <a:p>
+            <a:pPr lvl="1"/>
+            <a:r>
+              <a:rPr lang="en-US" dirty="0"/>
+              <a:t>Returns success/failure</a:t>
+            </a:r>
+          </a:p>
+          <a:p>
+            <a:r>
+              <a:rPr lang="en-US" dirty="0"/>
+              <a:t>Components</a:t>
+            </a:r>
+          </a:p>
+          <a:p>
+            <a:pPr lvl="1"/>
+            <a:r>
+              <a:rPr lang="en-US" dirty="0"/>
+              <a:t>Local Upload button</a:t>
+            </a:r>
+          </a:p>
+          <a:p>
+            <a:pPr lvl="1"/>
+            <a:r>
+              <a:rPr lang="en-US" dirty="0"/>
+              <a:t>File selection</a:t>
+            </a:r>
+          </a:p>
+          <a:p>
+            <a:pPr lvl="1"/>
+            <a:r>
+              <a:rPr lang="en-US" dirty="0"/>
+              <a:t>File type verification</a:t>
+            </a:r>
+          </a:p>
+          <a:p>
+            <a:pPr lvl="1"/>
+            <a:r>
+              <a:rPr lang="en-US" dirty="0"/>
+              <a:t>File size verification</a:t>
+            </a:r>
+          </a:p>
+          <a:p>
+            <a:pPr lvl="1"/>
+            <a:r>
+              <a:rPr lang="en-US" dirty="0"/>
+              <a:t>File conversion</a:t>
+            </a:r>
+          </a:p>
+        </p:txBody>
+      </p:sp>
+    </p:spTree>
+    <p:extLst>
+      <p:ext uri="{BB962C8B-B14F-4D97-AF65-F5344CB8AC3E}">
+        <p14:creationId xmlns:p14="http://schemas.microsoft.com/office/powerpoint/2010/main" val="3288010801"/>
+      </p:ext>
+    </p:extLst>
+  </p:cSld>
+  <p:clrMapOvr>
+    <a:masterClrMapping/>
+  </p:clrMapOvr>
+</p:sld>
+</file>
+
+<file path=ppt/slides/slide23.xml><?xml version="1.0" encoding="utf-8"?>
+<p:sld xmlns:a="http://schemas.openxmlformats.org/drawingml/2006/main" xmlns:r="http://schemas.openxmlformats.org/officeDocument/2006/relationships" xmlns:p="http://schemas.openxmlformats.org/presentationml/2006/main">
+  <p:cSld>
+    <p:spTree>
+      <p:nvGrpSpPr>
+        <p:cNvPr id="1" name=""/>
+        <p:cNvGrpSpPr/>
+        <p:nvPr/>
+      </p:nvGrpSpPr>
+      <p:grpSpPr>
+        <a:xfrm>
+          <a:off x="0" y="0"/>
+          <a:ext cx="0" cy="0"/>
+          <a:chOff x="0" y="0"/>
+          <a:chExt cx="0" cy="0"/>
+        </a:xfrm>
+      </p:grpSpPr>
+      <p:sp>
+        <p:nvSpPr>
+          <p:cNvPr id="2" name="Title 1"/>
+          <p:cNvSpPr>
+            <a:spLocks noGrp="1"/>
+          </p:cNvSpPr>
+          <p:nvPr>
+            <p:ph type="title"/>
+          </p:nvPr>
+        </p:nvSpPr>
+        <p:spPr/>
+        <p:txBody>
+          <a:bodyPr/>
+          <a:lstStyle/>
+          <a:p>
+            <a:r>
+              <a:rPr lang="en-US" dirty="0"/>
+              <a:t>Non Local File Upload Design</a:t>
+            </a:r>
+          </a:p>
+        </p:txBody>
+      </p:sp>
+      <p:sp>
+        <p:nvSpPr>
+          <p:cNvPr id="3" name="Content Placeholder 2"/>
+          <p:cNvSpPr>
+            <a:spLocks noGrp="1"/>
+          </p:cNvSpPr>
+          <p:nvPr>
+            <p:ph idx="1"/>
+          </p:nvPr>
+        </p:nvSpPr>
+        <p:spPr/>
+        <p:txBody>
+          <a:bodyPr/>
+          <a:lstStyle/>
+          <a:p>
+            <a:r>
+              <a:rPr lang="en-US" dirty="0"/>
+              <a:t>Login to Autodesk account</a:t>
+            </a:r>
+          </a:p>
+          <a:p>
+            <a:r>
+              <a:rPr lang="en-US" dirty="0"/>
+              <a:t>Give site permissions</a:t>
+            </a:r>
+          </a:p>
+          <a:p>
+            <a:r>
+              <a:rPr lang="en-US" dirty="0"/>
+              <a:t>Directed to A360 for file selection</a:t>
+            </a:r>
+          </a:p>
+          <a:p>
+            <a:r>
+              <a:rPr lang="en-US" dirty="0"/>
+              <a:t>File type verification</a:t>
+            </a:r>
+          </a:p>
+          <a:p>
+            <a:r>
+              <a:rPr lang="en-US" dirty="0"/>
+              <a:t>File size verification</a:t>
+            </a:r>
+          </a:p>
+          <a:p>
+            <a:r>
+              <a:rPr lang="en-US" dirty="0"/>
+              <a:t>File conversion</a:t>
+            </a:r>
+          </a:p>
+        </p:txBody>
+      </p:sp>
+    </p:spTree>
+    <p:extLst>
+      <p:ext uri="{BB962C8B-B14F-4D97-AF65-F5344CB8AC3E}">
+        <p14:creationId xmlns:p14="http://schemas.microsoft.com/office/powerpoint/2010/main" val="1188692582"/>
+      </p:ext>
+    </p:extLst>
+  </p:cSld>
+  <p:clrMapOvr>
+    <a:masterClrMapping/>
+  </p:clrMapOvr>
+</p:sld>
+</file>
+
+<file path=ppt/slides/slide24.xml><?xml version="1.0" encoding="utf-8"?>
+<p:sld xmlns:a="http://schemas.openxmlformats.org/drawingml/2006/main" xmlns:r="http://schemas.openxmlformats.org/officeDocument/2006/relationships" xmlns:p="http://schemas.openxmlformats.org/presentationml/2006/main">
+  <p:cSld>
+    <p:spTree>
+      <p:nvGrpSpPr>
+        <p:cNvPr id="1" name=""/>
+        <p:cNvGrpSpPr/>
+        <p:nvPr/>
+      </p:nvGrpSpPr>
+      <p:grpSpPr>
+        <a:xfrm>
+          <a:off x="0" y="0"/>
+          <a:ext cx="0" cy="0"/>
+          <a:chOff x="0" y="0"/>
+          <a:chExt cx="0" cy="0"/>
+        </a:xfrm>
+      </p:grpSpPr>
+      <p:sp>
+        <p:nvSpPr>
+          <p:cNvPr id="2" name="Title 1"/>
+          <p:cNvSpPr>
+            <a:spLocks noGrp="1"/>
+          </p:cNvSpPr>
+          <p:nvPr>
+            <p:ph type="title"/>
+          </p:nvPr>
+        </p:nvSpPr>
+        <p:spPr/>
+        <p:txBody>
+          <a:bodyPr/>
+          <a:lstStyle/>
+          <a:p>
+            <a:r>
+              <a:rPr lang="en-US" dirty="0"/>
+              <a:t>Smartphone Connection Design</a:t>
+            </a:r>
+          </a:p>
+        </p:txBody>
+      </p:sp>
+      <p:sp>
+        <p:nvSpPr>
+          <p:cNvPr id="3" name="Content Placeholder 2"/>
+          <p:cNvSpPr>
+            <a:spLocks noGrp="1"/>
+          </p:cNvSpPr>
+          <p:nvPr>
+            <p:ph idx="1"/>
+          </p:nvPr>
+        </p:nvSpPr>
+        <p:spPr/>
+        <p:txBody>
+          <a:bodyPr/>
+          <a:lstStyle/>
+          <a:p>
+            <a:r>
+              <a:rPr lang="en-US" dirty="0"/>
+              <a:t>Assumptions</a:t>
+            </a:r>
+          </a:p>
+          <a:p>
+            <a:pPr lvl="1"/>
+            <a:r>
+              <a:rPr lang="en-US" dirty="0"/>
+              <a:t>User has “smartphone”</a:t>
+            </a:r>
+          </a:p>
+          <a:p>
+            <a:pPr lvl="1"/>
+            <a:r>
+              <a:rPr lang="en-US" dirty="0"/>
+              <a:t>User has internet access</a:t>
+            </a:r>
+          </a:p>
+          <a:p>
+            <a:pPr lvl="1"/>
+            <a:r>
+              <a:rPr lang="en-US" dirty="0"/>
+              <a:t>User has QR scanner</a:t>
+            </a:r>
+          </a:p>
+          <a:p>
+            <a:r>
+              <a:rPr lang="en-US" dirty="0"/>
+              <a:t>Mobile device can access site with QR scanner</a:t>
+            </a:r>
+          </a:p>
+          <a:p>
+            <a:r>
+              <a:rPr lang="en-US" dirty="0"/>
+              <a:t>Components</a:t>
+            </a:r>
+          </a:p>
+          <a:p>
+            <a:pPr lvl="1"/>
+            <a:r>
+              <a:rPr lang="en-US" dirty="0"/>
+              <a:t>QR code</a:t>
+            </a:r>
+          </a:p>
+          <a:p>
+            <a:pPr lvl="1"/>
+            <a:r>
+              <a:rPr lang="en-US" dirty="0"/>
+              <a:t>Device connection</a:t>
+            </a:r>
+          </a:p>
+          <a:p>
+            <a:pPr lvl="1"/>
+            <a:r>
+              <a:rPr lang="en-US" dirty="0"/>
+              <a:t>Device view</a:t>
+            </a:r>
+          </a:p>
+          <a:p>
+            <a:endParaRPr lang="en-US" dirty="0"/>
+          </a:p>
+        </p:txBody>
+      </p:sp>
+    </p:spTree>
+    <p:extLst>
+      <p:ext uri="{BB962C8B-B14F-4D97-AF65-F5344CB8AC3E}">
+        <p14:creationId xmlns:p14="http://schemas.microsoft.com/office/powerpoint/2010/main" val="3684780182"/>
+      </p:ext>
+    </p:extLst>
+  </p:cSld>
+  <p:clrMapOvr>
+    <a:masterClrMapping/>
+  </p:clrMapOvr>
+</p:sld>
+</file>
+
+<file path=ppt/slides/slide25.xml><?xml version="1.0" encoding="utf-8"?>
+<p:sld xmlns:a="http://schemas.openxmlformats.org/drawingml/2006/main" xmlns:r="http://schemas.openxmlformats.org/officeDocument/2006/relationships" xmlns:p="http://schemas.openxmlformats.org/presentationml/2006/main">
+  <p:cSld>
+    <p:spTree>
+      <p:nvGrpSpPr>
+        <p:cNvPr id="1" name=""/>
+        <p:cNvGrpSpPr/>
+        <p:nvPr/>
+      </p:nvGrpSpPr>
+      <p:grpSpPr>
+        <a:xfrm>
+          <a:off x="0" y="0"/>
+          <a:ext cx="0" cy="0"/>
+          <a:chOff x="0" y="0"/>
+          <a:chExt cx="0" cy="0"/>
+        </a:xfrm>
+      </p:grpSpPr>
+      <p:sp>
+        <p:nvSpPr>
+          <p:cNvPr id="2" name="Title 1"/>
+          <p:cNvSpPr>
+            <a:spLocks noGrp="1"/>
+          </p:cNvSpPr>
+          <p:nvPr>
+            <p:ph type="title"/>
+          </p:nvPr>
+        </p:nvSpPr>
+        <p:spPr/>
+        <p:txBody>
+          <a:bodyPr/>
+          <a:lstStyle/>
+          <a:p>
+            <a:r>
+              <a:rPr lang="en-US" dirty="0"/>
+              <a:t>Week 3</a:t>
+            </a:r>
+          </a:p>
+        </p:txBody>
+      </p:sp>
+      <p:sp>
+        <p:nvSpPr>
+          <p:cNvPr id="3" name="Content Placeholder 2"/>
+          <p:cNvSpPr>
+            <a:spLocks noGrp="1"/>
+          </p:cNvSpPr>
+          <p:nvPr>
+            <p:ph idx="1"/>
+          </p:nvPr>
+        </p:nvSpPr>
+        <p:spPr/>
+        <p:txBody>
+          <a:bodyPr/>
+          <a:lstStyle/>
+          <a:p>
+            <a:r>
+              <a:rPr lang="en-US" dirty="0"/>
+              <a:t>Brainstorming ideas</a:t>
+            </a:r>
+          </a:p>
+          <a:p>
+            <a:r>
+              <a:rPr lang="en-US" dirty="0"/>
+              <a:t>Meeting with Patti</a:t>
+            </a:r>
+          </a:p>
+          <a:p>
+            <a:r>
+              <a:rPr lang="en-US" dirty="0"/>
+              <a:t>Another meeting with Patti and Jim</a:t>
+            </a:r>
+          </a:p>
+          <a:p>
+            <a:pPr lvl="1"/>
+            <a:r>
+              <a:rPr lang="en-US" dirty="0"/>
+              <a:t>Intro to Vrok.it</a:t>
+            </a:r>
+          </a:p>
+          <a:p>
+            <a:pPr lvl="1"/>
+            <a:r>
+              <a:rPr lang="en-US" dirty="0"/>
+              <a:t>Polygon reduction?</a:t>
+            </a:r>
+          </a:p>
+          <a:p>
+            <a:pPr lvl="1"/>
+            <a:r>
+              <a:rPr lang="en-US" dirty="0"/>
+              <a:t>Potential VR reduction?</a:t>
+            </a:r>
+          </a:p>
+          <a:p>
+            <a:r>
+              <a:rPr lang="en-US" dirty="0"/>
+              <a:t>Began idea of what we were doing.</a:t>
+            </a:r>
+          </a:p>
+          <a:p>
+            <a:pPr lvl="1"/>
+            <a:r>
+              <a:rPr lang="en-US" dirty="0"/>
+              <a:t>Nothing concrete…</a:t>
+            </a:r>
+          </a:p>
+        </p:txBody>
+      </p:sp>
+    </p:spTree>
+    <p:extLst>
+      <p:ext uri="{BB962C8B-B14F-4D97-AF65-F5344CB8AC3E}">
+        <p14:creationId xmlns:p14="http://schemas.microsoft.com/office/powerpoint/2010/main" val="3357475344"/>
+      </p:ext>
+    </p:extLst>
+  </p:cSld>
+  <p:clrMapOvr>
+    <a:masterClrMapping/>
+  </p:clrMapOvr>
+</p:sld>
+</file>
+
+<file path=ppt/slides/slide26.xml><?xml version="1.0" encoding="utf-8"?>
+<p:sld xmlns:a="http://schemas.openxmlformats.org/drawingml/2006/main" xmlns:r="http://schemas.openxmlformats.org/officeDocument/2006/relationships" xmlns:p="http://schemas.openxmlformats.org/presentationml/2006/main">
+  <p:cSld>
+    <p:spTree>
+      <p:nvGrpSpPr>
+        <p:cNvPr id="1" name=""/>
+        <p:cNvGrpSpPr/>
+        <p:nvPr/>
+      </p:nvGrpSpPr>
+      <p:grpSpPr>
+        <a:xfrm>
+          <a:off x="0" y="0"/>
+          <a:ext cx="0" cy="0"/>
+          <a:chOff x="0" y="0"/>
+          <a:chExt cx="0" cy="0"/>
+        </a:xfrm>
+      </p:grpSpPr>
+      <p:sp>
+        <p:nvSpPr>
+          <p:cNvPr id="2" name="Title 1"/>
+          <p:cNvSpPr>
+            <a:spLocks noGrp="1"/>
+          </p:cNvSpPr>
+          <p:nvPr>
+            <p:ph type="title"/>
+          </p:nvPr>
+        </p:nvSpPr>
+        <p:spPr/>
+        <p:txBody>
+          <a:bodyPr/>
+          <a:lstStyle/>
+          <a:p>
+            <a:r>
+              <a:rPr lang="en-US" dirty="0"/>
+              <a:t>Week 4</a:t>
+            </a:r>
+          </a:p>
+        </p:txBody>
+      </p:sp>
+      <p:sp>
+        <p:nvSpPr>
+          <p:cNvPr id="3" name="Content Placeholder 2"/>
+          <p:cNvSpPr>
+            <a:spLocks noGrp="1"/>
+          </p:cNvSpPr>
+          <p:nvPr>
+            <p:ph idx="1"/>
+          </p:nvPr>
+        </p:nvSpPr>
+        <p:spPr/>
+        <p:txBody>
+          <a:bodyPr/>
+          <a:lstStyle/>
+          <a:p>
+            <a:r>
+              <a:rPr lang="en-US" dirty="0"/>
+              <a:t>Problem statement assigned</a:t>
+            </a:r>
+          </a:p>
+          <a:p>
+            <a:pPr lvl="1"/>
+            <a:r>
+              <a:rPr lang="en-US" dirty="0"/>
+              <a:t>However, project not refined enough</a:t>
+            </a:r>
+          </a:p>
+          <a:p>
+            <a:r>
+              <a:rPr lang="en-US" dirty="0"/>
+              <a:t>Another conference call with Patti</a:t>
+            </a:r>
+          </a:p>
+          <a:p>
+            <a:pPr lvl="1"/>
+            <a:r>
+              <a:rPr lang="en-US" dirty="0"/>
+              <a:t>Working out more details</a:t>
+            </a:r>
+          </a:p>
+          <a:p>
+            <a:pPr lvl="1"/>
+            <a:r>
+              <a:rPr lang="en-US" dirty="0"/>
+              <a:t>Got in contact with Vrok.it creator, Kean</a:t>
+            </a:r>
+          </a:p>
+          <a:p>
+            <a:r>
+              <a:rPr lang="en-US" dirty="0"/>
+              <a:t>Still not enough information to begin problem statement</a:t>
+            </a:r>
+          </a:p>
+          <a:p>
+            <a:pPr marL="457200" lvl="1" indent="0">
+              <a:buNone/>
+            </a:pPr>
+            <a:endParaRPr lang="en-US" dirty="0"/>
+          </a:p>
+        </p:txBody>
+      </p:sp>
+    </p:spTree>
+    <p:extLst>
+      <p:ext uri="{BB962C8B-B14F-4D97-AF65-F5344CB8AC3E}">
+        <p14:creationId xmlns:p14="http://schemas.microsoft.com/office/powerpoint/2010/main" val="3816315661"/>
+      </p:ext>
+    </p:extLst>
+  </p:cSld>
+  <p:clrMapOvr>
+    <a:masterClrMapping/>
+  </p:clrMapOvr>
+</p:sld>
+</file>
+
+<file path=ppt/slides/slide27.xml><?xml version="1.0" encoding="utf-8"?>
+<p:sld xmlns:a="http://schemas.openxmlformats.org/drawingml/2006/main" xmlns:r="http://schemas.openxmlformats.org/officeDocument/2006/relationships" xmlns:p="http://schemas.openxmlformats.org/presentationml/2006/main">
+  <p:cSld>
+    <p:spTree>
+      <p:nvGrpSpPr>
+        <p:cNvPr id="1" name=""/>
+        <p:cNvGrpSpPr/>
+        <p:nvPr/>
+      </p:nvGrpSpPr>
+      <p:grpSpPr>
+        <a:xfrm>
+          <a:off x="0" y="0"/>
+          <a:ext cx="0" cy="0"/>
+          <a:chOff x="0" y="0"/>
+          <a:chExt cx="0" cy="0"/>
+        </a:xfrm>
+      </p:grpSpPr>
+      <p:sp>
+        <p:nvSpPr>
+          <p:cNvPr id="2" name="Title 1"/>
+          <p:cNvSpPr>
+            <a:spLocks noGrp="1"/>
+          </p:cNvSpPr>
+          <p:nvPr>
+            <p:ph type="title"/>
+          </p:nvPr>
+        </p:nvSpPr>
+        <p:spPr/>
+        <p:txBody>
+          <a:bodyPr/>
+          <a:lstStyle/>
+          <a:p>
+            <a:r>
+              <a:rPr lang="en-US" dirty="0"/>
+              <a:t>Week 5</a:t>
+            </a:r>
+          </a:p>
+        </p:txBody>
+      </p:sp>
+      <p:sp>
+        <p:nvSpPr>
+          <p:cNvPr id="3" name="Content Placeholder 2"/>
+          <p:cNvSpPr>
+            <a:spLocks noGrp="1"/>
+          </p:cNvSpPr>
+          <p:nvPr>
+            <p:ph idx="1"/>
+          </p:nvPr>
+        </p:nvSpPr>
+        <p:spPr/>
+        <p:txBody>
+          <a:bodyPr/>
+          <a:lstStyle/>
+          <a:p>
+            <a:r>
+              <a:rPr lang="en-US" dirty="0"/>
+              <a:t>Had official meeting with Kean and Patti</a:t>
+            </a:r>
+          </a:p>
+          <a:p>
+            <a:pPr lvl="1"/>
+            <a:r>
+              <a:rPr lang="en-US" dirty="0"/>
+              <a:t>Enough information to finish problem statement</a:t>
+            </a:r>
+          </a:p>
+          <a:p>
+            <a:pPr lvl="1"/>
+            <a:r>
+              <a:rPr lang="en-US" dirty="0"/>
+              <a:t>More user focused</a:t>
+            </a:r>
+          </a:p>
+          <a:p>
+            <a:pPr lvl="1"/>
+            <a:r>
+              <a:rPr lang="en-US" dirty="0"/>
+              <a:t>Increasing performance if possible, but not optimizing</a:t>
+            </a:r>
+          </a:p>
+          <a:p>
+            <a:r>
+              <a:rPr lang="en-US" dirty="0"/>
+              <a:t>Viewer, VR content added in</a:t>
+            </a:r>
+          </a:p>
+          <a:p>
+            <a:r>
+              <a:rPr lang="en-US" dirty="0"/>
+              <a:t>Requirements document work begins</a:t>
+            </a:r>
+          </a:p>
+        </p:txBody>
+      </p:sp>
+    </p:spTree>
+    <p:extLst>
+      <p:ext uri="{BB962C8B-B14F-4D97-AF65-F5344CB8AC3E}">
+        <p14:creationId xmlns:p14="http://schemas.microsoft.com/office/powerpoint/2010/main" val="1610455051"/>
+      </p:ext>
+    </p:extLst>
+  </p:cSld>
+  <p:clrMapOvr>
+    <a:masterClrMapping/>
+  </p:clrMapOvr>
+</p:sld>
+</file>
+
+<file path=ppt/slides/slide28.xml><?xml version="1.0" encoding="utf-8"?>
+<p:sld xmlns:a="http://schemas.openxmlformats.org/drawingml/2006/main" xmlns:r="http://schemas.openxmlformats.org/officeDocument/2006/relationships" xmlns:p="http://schemas.openxmlformats.org/presentationml/2006/main">
+  <p:cSld>
+    <p:spTree>
+      <p:nvGrpSpPr>
+        <p:cNvPr id="1" name=""/>
+        <p:cNvGrpSpPr/>
+        <p:nvPr/>
+      </p:nvGrpSpPr>
+      <p:grpSpPr>
+        <a:xfrm>
+          <a:off x="0" y="0"/>
+          <a:ext cx="0" cy="0"/>
+          <a:chOff x="0" y="0"/>
+          <a:chExt cx="0" cy="0"/>
+        </a:xfrm>
+      </p:grpSpPr>
+      <p:sp>
+        <p:nvSpPr>
+          <p:cNvPr id="2" name="Title 1"/>
+          <p:cNvSpPr>
+            <a:spLocks noGrp="1"/>
+          </p:cNvSpPr>
+          <p:nvPr>
+            <p:ph type="title"/>
+          </p:nvPr>
+        </p:nvSpPr>
+        <p:spPr/>
+        <p:txBody>
+          <a:bodyPr/>
+          <a:lstStyle/>
+          <a:p>
+            <a:r>
+              <a:rPr lang="en-US" dirty="0"/>
+              <a:t>Week 6</a:t>
+            </a:r>
+          </a:p>
+        </p:txBody>
+      </p:sp>
+      <p:sp>
+        <p:nvSpPr>
+          <p:cNvPr id="3" name="Content Placeholder 2"/>
+          <p:cNvSpPr>
+            <a:spLocks noGrp="1"/>
+          </p:cNvSpPr>
+          <p:nvPr>
+            <p:ph idx="1"/>
+          </p:nvPr>
+        </p:nvSpPr>
+        <p:spPr/>
+        <p:txBody>
+          <a:bodyPr/>
+          <a:lstStyle/>
+          <a:p>
+            <a:r>
+              <a:rPr lang="en-US" dirty="0"/>
+              <a:t>Hard to meet with client</a:t>
+            </a:r>
+          </a:p>
+          <a:p>
+            <a:r>
+              <a:rPr lang="en-US" dirty="0"/>
+              <a:t>Wanted </a:t>
+            </a:r>
+            <a:r>
+              <a:rPr lang="en-US" dirty="0" err="1"/>
+              <a:t>Nels</a:t>
+            </a:r>
+            <a:r>
+              <a:rPr lang="en-US" dirty="0"/>
+              <a:t> to join the next meeting </a:t>
+            </a:r>
+          </a:p>
+          <a:p>
+            <a:pPr lvl="1"/>
+            <a:r>
+              <a:rPr lang="en-US" dirty="0"/>
+              <a:t>Help narrow scope more</a:t>
+            </a:r>
+          </a:p>
+          <a:p>
+            <a:pPr lvl="1"/>
+            <a:r>
+              <a:rPr lang="en-US" dirty="0"/>
+              <a:t>Help convey capstone intentions as well</a:t>
+            </a:r>
+          </a:p>
+          <a:p>
+            <a:r>
+              <a:rPr lang="en-US" dirty="0"/>
+              <a:t>Unable to get question answered due to Autodesk event</a:t>
+            </a:r>
+          </a:p>
+        </p:txBody>
+      </p:sp>
+    </p:spTree>
+    <p:extLst>
+      <p:ext uri="{BB962C8B-B14F-4D97-AF65-F5344CB8AC3E}">
+        <p14:creationId xmlns:p14="http://schemas.microsoft.com/office/powerpoint/2010/main" val="270471938"/>
+      </p:ext>
+    </p:extLst>
+  </p:cSld>
+  <p:clrMapOvr>
+    <a:masterClrMapping/>
+  </p:clrMapOvr>
+</p:sld>
+</file>
+
+<file path=ppt/slides/slide29.xml><?xml version="1.0" encoding="utf-8"?>
+<p:sld xmlns:a="http://schemas.openxmlformats.org/drawingml/2006/main" xmlns:r="http://schemas.openxmlformats.org/officeDocument/2006/relationships" xmlns:p="http://schemas.openxmlformats.org/presentationml/2006/main">
+  <p:cSld>
+    <p:spTree>
+      <p:nvGrpSpPr>
+        <p:cNvPr id="1" name=""/>
+        <p:cNvGrpSpPr/>
+        <p:nvPr/>
+      </p:nvGrpSpPr>
+      <p:grpSpPr>
+        <a:xfrm>
+          <a:off x="0" y="0"/>
+          <a:ext cx="0" cy="0"/>
+          <a:chOff x="0" y="0"/>
+          <a:chExt cx="0" cy="0"/>
+        </a:xfrm>
+      </p:grpSpPr>
+      <p:sp>
+        <p:nvSpPr>
+          <p:cNvPr id="2" name="Title 1"/>
+          <p:cNvSpPr>
+            <a:spLocks noGrp="1"/>
+          </p:cNvSpPr>
+          <p:nvPr>
+            <p:ph type="title"/>
+          </p:nvPr>
+        </p:nvSpPr>
+        <p:spPr/>
+        <p:txBody>
+          <a:bodyPr/>
+          <a:lstStyle/>
+          <a:p>
+            <a:r>
+              <a:rPr lang="en-US" dirty="0"/>
+              <a:t>Week 7</a:t>
+            </a:r>
+          </a:p>
+        </p:txBody>
+      </p:sp>
+      <p:sp>
+        <p:nvSpPr>
+          <p:cNvPr id="3" name="Content Placeholder 2"/>
+          <p:cNvSpPr>
+            <a:spLocks noGrp="1"/>
+          </p:cNvSpPr>
+          <p:nvPr>
+            <p:ph idx="1"/>
+          </p:nvPr>
+        </p:nvSpPr>
+        <p:spPr/>
+        <p:txBody>
+          <a:bodyPr/>
+          <a:lstStyle/>
+          <a:p>
+            <a:r>
+              <a:rPr lang="en-US" dirty="0"/>
+              <a:t>Requirements Document draft finished</a:t>
+            </a:r>
+          </a:p>
+          <a:p>
+            <a:pPr lvl="1"/>
+            <a:r>
+              <a:rPr lang="en-US" dirty="0"/>
+              <a:t>Feedback received</a:t>
+            </a:r>
+          </a:p>
+          <a:p>
+            <a:pPr lvl="2"/>
+            <a:r>
+              <a:rPr lang="en-US" dirty="0"/>
+              <a:t>Needed to be more descriptive</a:t>
+            </a:r>
+          </a:p>
+          <a:p>
+            <a:pPr lvl="1"/>
+            <a:r>
+              <a:rPr lang="en-US" dirty="0"/>
+              <a:t>Needed to incorporate more APIs if possible</a:t>
+            </a:r>
+          </a:p>
+          <a:p>
+            <a:r>
+              <a:rPr lang="en-US" dirty="0"/>
+              <a:t>Able to contact Patti and setup meeting</a:t>
+            </a:r>
+          </a:p>
+          <a:p>
+            <a:r>
+              <a:rPr lang="en-US" dirty="0"/>
+              <a:t>Tech review and requirements document final coincide</a:t>
+            </a:r>
+          </a:p>
+          <a:p>
+            <a:r>
+              <a:rPr lang="en-US" dirty="0"/>
+              <a:t>Paul fell ill, low communication and contribution</a:t>
+            </a:r>
+          </a:p>
+        </p:txBody>
+      </p:sp>
+    </p:spTree>
+    <p:extLst>
+      <p:ext uri="{BB962C8B-B14F-4D97-AF65-F5344CB8AC3E}">
+        <p14:creationId xmlns:p14="http://schemas.microsoft.com/office/powerpoint/2010/main" val="4206706309"/>
       </p:ext>
     </p:extLst>
   </p:cSld>
@@ -3166,6 +5470,65 @@
           <a:chExt cx="0" cy="0"/>
         </a:xfrm>
       </p:grpSpPr>
+      <p:pic>
+        <p:nvPicPr>
+          <p:cNvPr id="4" name="Content Placeholder 3"/>
+          <p:cNvPicPr>
+            <a:picLocks noGrp="1" noChangeAspect="1"/>
+          </p:cNvPicPr>
+          <p:nvPr>
+            <p:ph idx="1"/>
+          </p:nvPr>
+        </p:nvPicPr>
+        <p:blipFill>
+          <a:blip r:embed="rId2">
+            <a:extLst>
+              <a:ext uri="{28A0092B-C50C-407E-A947-70E740481C1C}">
+                <a14:useLocalDpi xmlns:a14="http://schemas.microsoft.com/office/drawing/2010/main" val="0"/>
+              </a:ext>
+            </a:extLst>
+          </a:blip>
+          <a:stretch>
+            <a:fillRect/>
+          </a:stretch>
+        </p:blipFill>
+        <p:spPr>
+          <a:xfrm>
+            <a:off x="0" y="300907"/>
+            <a:ext cx="12332513" cy="5816236"/>
+          </a:xfrm>
+        </p:spPr>
+      </p:pic>
+    </p:spTree>
+    <p:extLst>
+      <p:ext uri="{BB962C8B-B14F-4D97-AF65-F5344CB8AC3E}">
+        <p14:creationId xmlns:p14="http://schemas.microsoft.com/office/powerpoint/2010/main" val="2584541822"/>
+      </p:ext>
+    </p:extLst>
+  </p:cSld>
+  <p:clrMapOvr>
+    <a:masterClrMapping/>
+  </p:clrMapOvr>
+</p:sld>
+</file>
+
+<file path=ppt/slides/slide30.xml><?xml version="1.0" encoding="utf-8"?>
+<p:sld xmlns:a="http://schemas.openxmlformats.org/drawingml/2006/main" xmlns:r="http://schemas.openxmlformats.org/officeDocument/2006/relationships" xmlns:p="http://schemas.openxmlformats.org/presentationml/2006/main">
+  <p:cSld>
+    <p:spTree>
+      <p:nvGrpSpPr>
+        <p:cNvPr id="1" name=""/>
+        <p:cNvGrpSpPr/>
+        <p:nvPr/>
+      </p:nvGrpSpPr>
+      <p:grpSpPr>
+        <a:xfrm>
+          <a:off x="0" y="0"/>
+          <a:ext cx="0" cy="0"/>
+          <a:chOff x="0" y="0"/>
+          <a:chExt cx="0" cy="0"/>
+        </a:xfrm>
+      </p:grpSpPr>
       <p:sp>
         <p:nvSpPr>
           <p:cNvPr id="2" name="Title 1"/>
@@ -3183,6 +5546,696 @@
           <a:p>
             <a:r>
               <a:rPr lang="en-US" dirty="0"/>
+              <a:t>Week 8 </a:t>
+            </a:r>
+            <a:endParaRPr lang="en-US" dirty="0"/>
+          </a:p>
+        </p:txBody>
+      </p:sp>
+      <p:sp>
+        <p:nvSpPr>
+          <p:cNvPr id="3" name="Content Placeholder 2"/>
+          <p:cNvSpPr>
+            <a:spLocks noGrp="1"/>
+          </p:cNvSpPr>
+          <p:nvPr>
+            <p:ph idx="1"/>
+          </p:nvPr>
+        </p:nvSpPr>
+        <p:spPr/>
+        <p:txBody>
+          <a:bodyPr/>
+          <a:lstStyle/>
+          <a:p>
+            <a:r>
+              <a:rPr lang="en-US" dirty="0"/>
+              <a:t>Tech reviews submitted</a:t>
+            </a:r>
+          </a:p>
+          <a:p>
+            <a:pPr lvl="1"/>
+            <a:r>
+              <a:rPr lang="en-US" dirty="0"/>
+              <a:t>Not bad, could have used more time</a:t>
+            </a:r>
+          </a:p>
+          <a:p>
+            <a:pPr lvl="1"/>
+            <a:r>
+              <a:rPr lang="en-US" dirty="0"/>
+              <a:t>Good way to understand more components</a:t>
+            </a:r>
+          </a:p>
+          <a:p>
+            <a:r>
+              <a:rPr lang="en-US" dirty="0"/>
+              <a:t>Meeting with </a:t>
+            </a:r>
+            <a:r>
+              <a:rPr lang="en-US" dirty="0" err="1"/>
+              <a:t>Nels</a:t>
+            </a:r>
+            <a:r>
+              <a:rPr lang="en-US" dirty="0"/>
+              <a:t> and Patti, no Jim however</a:t>
+            </a:r>
+          </a:p>
+          <a:p>
+            <a:pPr lvl="1"/>
+            <a:r>
+              <a:rPr lang="en-US" dirty="0"/>
+              <a:t>Able to work out some more important details</a:t>
+            </a:r>
+          </a:p>
+          <a:p>
+            <a:pPr lvl="1"/>
+            <a:r>
+              <a:rPr lang="en-US" dirty="0"/>
+              <a:t>Not able to talk about performance tweaking</a:t>
+            </a:r>
+          </a:p>
+          <a:p>
+            <a:r>
+              <a:rPr lang="en-US" dirty="0"/>
+              <a:t>Overall quite productive week</a:t>
+            </a:r>
+          </a:p>
+        </p:txBody>
+      </p:sp>
+    </p:spTree>
+    <p:extLst>
+      <p:ext uri="{BB962C8B-B14F-4D97-AF65-F5344CB8AC3E}">
+        <p14:creationId xmlns:p14="http://schemas.microsoft.com/office/powerpoint/2010/main" val="2635992290"/>
+      </p:ext>
+    </p:extLst>
+  </p:cSld>
+  <p:clrMapOvr>
+    <a:masterClrMapping/>
+  </p:clrMapOvr>
+</p:sld>
+</file>
+
+<file path=ppt/slides/slide31.xml><?xml version="1.0" encoding="utf-8"?>
+<p:sld xmlns:a="http://schemas.openxmlformats.org/drawingml/2006/main" xmlns:r="http://schemas.openxmlformats.org/officeDocument/2006/relationships" xmlns:p="http://schemas.openxmlformats.org/presentationml/2006/main">
+  <p:cSld>
+    <p:spTree>
+      <p:nvGrpSpPr>
+        <p:cNvPr id="1" name=""/>
+        <p:cNvGrpSpPr/>
+        <p:nvPr/>
+      </p:nvGrpSpPr>
+      <p:grpSpPr>
+        <a:xfrm>
+          <a:off x="0" y="0"/>
+          <a:ext cx="0" cy="0"/>
+          <a:chOff x="0" y="0"/>
+          <a:chExt cx="0" cy="0"/>
+        </a:xfrm>
+      </p:grpSpPr>
+      <p:sp>
+        <p:nvSpPr>
+          <p:cNvPr id="2" name="Title 1"/>
+          <p:cNvSpPr>
+            <a:spLocks noGrp="1"/>
+          </p:cNvSpPr>
+          <p:nvPr>
+            <p:ph type="title"/>
+          </p:nvPr>
+        </p:nvSpPr>
+        <p:spPr/>
+        <p:txBody>
+          <a:bodyPr/>
+          <a:lstStyle/>
+          <a:p>
+            <a:r>
+              <a:rPr lang="en-US" dirty="0"/>
+              <a:t>Week 9</a:t>
+            </a:r>
+            <a:endParaRPr lang="en-US" dirty="0"/>
+          </a:p>
+        </p:txBody>
+      </p:sp>
+      <p:sp>
+        <p:nvSpPr>
+          <p:cNvPr id="3" name="Content Placeholder 2"/>
+          <p:cNvSpPr>
+            <a:spLocks noGrp="1"/>
+          </p:cNvSpPr>
+          <p:nvPr>
+            <p:ph idx="1"/>
+          </p:nvPr>
+        </p:nvSpPr>
+        <p:spPr/>
+        <p:txBody>
+          <a:bodyPr/>
+          <a:lstStyle/>
+          <a:p>
+            <a:r>
+              <a:rPr lang="en-US" dirty="0"/>
+              <a:t>Least productive week</a:t>
+            </a:r>
+          </a:p>
+          <a:p>
+            <a:r>
+              <a:rPr lang="en-US" dirty="0"/>
+              <a:t>Thanksgiving and travelling</a:t>
+            </a:r>
+          </a:p>
+          <a:p>
+            <a:r>
+              <a:rPr lang="en-US" dirty="0"/>
+              <a:t>Design Document due in the next week</a:t>
+            </a:r>
+          </a:p>
+          <a:p>
+            <a:pPr lvl="1"/>
+            <a:r>
+              <a:rPr lang="en-US" dirty="0"/>
+              <a:t>Documentation hard to decipher</a:t>
+            </a:r>
+          </a:p>
+          <a:p>
+            <a:pPr lvl="1"/>
+            <a:r>
+              <a:rPr lang="en-US" dirty="0"/>
+              <a:t>Not able to break down as a group</a:t>
+            </a:r>
+          </a:p>
+          <a:p>
+            <a:r>
+              <a:rPr lang="en-US" dirty="0"/>
+              <a:t>Final draft of requirements document finished out</a:t>
+            </a:r>
+          </a:p>
+        </p:txBody>
+      </p:sp>
+    </p:spTree>
+    <p:extLst>
+      <p:ext uri="{BB962C8B-B14F-4D97-AF65-F5344CB8AC3E}">
+        <p14:creationId xmlns:p14="http://schemas.microsoft.com/office/powerpoint/2010/main" val="4177011364"/>
+      </p:ext>
+    </p:extLst>
+  </p:cSld>
+  <p:clrMapOvr>
+    <a:masterClrMapping/>
+  </p:clrMapOvr>
+</p:sld>
+</file>
+
+<file path=ppt/slides/slide32.xml><?xml version="1.0" encoding="utf-8"?>
+<p:sld xmlns:a="http://schemas.openxmlformats.org/drawingml/2006/main" xmlns:r="http://schemas.openxmlformats.org/officeDocument/2006/relationships" xmlns:p="http://schemas.openxmlformats.org/presentationml/2006/main">
+  <p:cSld>
+    <p:spTree>
+      <p:nvGrpSpPr>
+        <p:cNvPr id="1" name=""/>
+        <p:cNvGrpSpPr/>
+        <p:nvPr/>
+      </p:nvGrpSpPr>
+      <p:grpSpPr>
+        <a:xfrm>
+          <a:off x="0" y="0"/>
+          <a:ext cx="0" cy="0"/>
+          <a:chOff x="0" y="0"/>
+          <a:chExt cx="0" cy="0"/>
+        </a:xfrm>
+      </p:grpSpPr>
+      <p:sp>
+        <p:nvSpPr>
+          <p:cNvPr id="2" name="Title 1"/>
+          <p:cNvSpPr>
+            <a:spLocks noGrp="1"/>
+          </p:cNvSpPr>
+          <p:nvPr>
+            <p:ph type="title"/>
+          </p:nvPr>
+        </p:nvSpPr>
+        <p:spPr/>
+        <p:txBody>
+          <a:bodyPr/>
+          <a:lstStyle/>
+          <a:p>
+            <a:r>
+              <a:rPr lang="en-US" dirty="0"/>
+              <a:t>Week 10</a:t>
+            </a:r>
+            <a:endParaRPr lang="en-US" dirty="0"/>
+          </a:p>
+        </p:txBody>
+      </p:sp>
+      <p:sp>
+        <p:nvSpPr>
+          <p:cNvPr id="3" name="Content Placeholder 2"/>
+          <p:cNvSpPr>
+            <a:spLocks noGrp="1"/>
+          </p:cNvSpPr>
+          <p:nvPr>
+            <p:ph idx="1"/>
+          </p:nvPr>
+        </p:nvSpPr>
+        <p:spPr/>
+        <p:txBody>
+          <a:bodyPr/>
+          <a:lstStyle/>
+          <a:p>
+            <a:r>
+              <a:rPr lang="en-US" dirty="0"/>
+              <a:t>Lots of work conflict with other classes</a:t>
+            </a:r>
+          </a:p>
+          <a:p>
+            <a:r>
+              <a:rPr lang="en-US" dirty="0"/>
+              <a:t>Design document</a:t>
+            </a:r>
+          </a:p>
+          <a:p>
+            <a:pPr lvl="1"/>
+            <a:r>
+              <a:rPr lang="en-US" dirty="0"/>
+              <a:t>Still issues figuring out the IEEE document</a:t>
+            </a:r>
+          </a:p>
+          <a:p>
+            <a:pPr lvl="1"/>
+            <a:r>
+              <a:rPr lang="en-US" dirty="0"/>
+              <a:t>Talk with Kirsten and </a:t>
+            </a:r>
+            <a:r>
+              <a:rPr lang="en-US" dirty="0" err="1"/>
+              <a:t>Nels</a:t>
+            </a:r>
+            <a:r>
+              <a:rPr lang="en-US" dirty="0"/>
+              <a:t> helped</a:t>
+            </a:r>
+          </a:p>
+          <a:p>
+            <a:pPr lvl="1"/>
+            <a:r>
+              <a:rPr lang="en-US" dirty="0"/>
+              <a:t>Got good work done on the document</a:t>
+            </a:r>
+          </a:p>
+        </p:txBody>
+      </p:sp>
+    </p:spTree>
+    <p:extLst>
+      <p:ext uri="{BB962C8B-B14F-4D97-AF65-F5344CB8AC3E}">
+        <p14:creationId xmlns:p14="http://schemas.microsoft.com/office/powerpoint/2010/main" val="2146190001"/>
+      </p:ext>
+    </p:extLst>
+  </p:cSld>
+  <p:clrMapOvr>
+    <a:masterClrMapping/>
+  </p:clrMapOvr>
+</p:sld>
+</file>
+
+<file path=ppt/slides/slide33.xml><?xml version="1.0" encoding="utf-8"?>
+<p:sld xmlns:a="http://schemas.openxmlformats.org/drawingml/2006/main" xmlns:r="http://schemas.openxmlformats.org/officeDocument/2006/relationships" xmlns:p="http://schemas.openxmlformats.org/presentationml/2006/main">
+  <p:cSld>
+    <p:spTree>
+      <p:nvGrpSpPr>
+        <p:cNvPr id="1" name=""/>
+        <p:cNvGrpSpPr/>
+        <p:nvPr/>
+      </p:nvGrpSpPr>
+      <p:grpSpPr>
+        <a:xfrm>
+          <a:off x="0" y="0"/>
+          <a:ext cx="0" cy="0"/>
+          <a:chOff x="0" y="0"/>
+          <a:chExt cx="0" cy="0"/>
+        </a:xfrm>
+      </p:grpSpPr>
+      <p:sp>
+        <p:nvSpPr>
+          <p:cNvPr id="2" name="Title 1"/>
+          <p:cNvSpPr>
+            <a:spLocks noGrp="1"/>
+          </p:cNvSpPr>
+          <p:nvPr>
+            <p:ph type="title"/>
+          </p:nvPr>
+        </p:nvSpPr>
+        <p:spPr/>
+        <p:txBody>
+          <a:bodyPr/>
+          <a:lstStyle/>
+          <a:p>
+            <a:r>
+              <a:rPr lang="en-US" dirty="0"/>
+              <a:t>Problems</a:t>
+            </a:r>
+          </a:p>
+        </p:txBody>
+      </p:sp>
+      <p:sp>
+        <p:nvSpPr>
+          <p:cNvPr id="3" name="Content Placeholder 2"/>
+          <p:cNvSpPr>
+            <a:spLocks noGrp="1"/>
+          </p:cNvSpPr>
+          <p:nvPr>
+            <p:ph idx="1"/>
+          </p:nvPr>
+        </p:nvSpPr>
+        <p:spPr/>
+        <p:txBody>
+          <a:bodyPr/>
+          <a:lstStyle/>
+          <a:p>
+            <a:r>
+              <a:rPr lang="en-US" dirty="0"/>
+              <a:t>Low communication with client</a:t>
+            </a:r>
+          </a:p>
+          <a:p>
+            <a:pPr lvl="1"/>
+            <a:r>
+              <a:rPr lang="en-US" dirty="0"/>
+              <a:t>Not enough question on our side</a:t>
+            </a:r>
+          </a:p>
+          <a:p>
+            <a:pPr lvl="1"/>
+            <a:r>
+              <a:rPr lang="en-US" dirty="0"/>
+              <a:t>Not enough time on theirs</a:t>
+            </a:r>
+          </a:p>
+          <a:p>
+            <a:r>
+              <a:rPr lang="en-US" dirty="0"/>
+              <a:t>Team work</a:t>
+            </a:r>
+          </a:p>
+          <a:p>
+            <a:pPr lvl="1"/>
+            <a:r>
+              <a:rPr lang="en-US" dirty="0"/>
+              <a:t>Better planning</a:t>
+            </a:r>
+          </a:p>
+          <a:p>
+            <a:pPr lvl="1"/>
+            <a:r>
+              <a:rPr lang="en-US" dirty="0"/>
+              <a:t>Better communication</a:t>
+            </a:r>
+          </a:p>
+          <a:p>
+            <a:pPr lvl="1"/>
+            <a:r>
+              <a:rPr lang="en-US" dirty="0"/>
+              <a:t>Faster help seeking</a:t>
+            </a:r>
+          </a:p>
+        </p:txBody>
+      </p:sp>
+    </p:spTree>
+    <p:extLst>
+      <p:ext uri="{BB962C8B-B14F-4D97-AF65-F5344CB8AC3E}">
+        <p14:creationId xmlns:p14="http://schemas.microsoft.com/office/powerpoint/2010/main" val="1253775864"/>
+      </p:ext>
+    </p:extLst>
+  </p:cSld>
+  <p:clrMapOvr>
+    <a:masterClrMapping/>
+  </p:clrMapOvr>
+</p:sld>
+</file>
+
+<file path=ppt/slides/slide34.xml><?xml version="1.0" encoding="utf-8"?>
+<p:sld xmlns:a="http://schemas.openxmlformats.org/drawingml/2006/main" xmlns:r="http://schemas.openxmlformats.org/officeDocument/2006/relationships" xmlns:p="http://schemas.openxmlformats.org/presentationml/2006/main">
+  <p:cSld>
+    <p:spTree>
+      <p:nvGrpSpPr>
+        <p:cNvPr id="1" name=""/>
+        <p:cNvGrpSpPr/>
+        <p:nvPr/>
+      </p:nvGrpSpPr>
+      <p:grpSpPr>
+        <a:xfrm>
+          <a:off x="0" y="0"/>
+          <a:ext cx="0" cy="0"/>
+          <a:chOff x="0" y="0"/>
+          <a:chExt cx="0" cy="0"/>
+        </a:xfrm>
+      </p:grpSpPr>
+      <p:sp>
+        <p:nvSpPr>
+          <p:cNvPr id="2" name="Title 1"/>
+          <p:cNvSpPr>
+            <a:spLocks noGrp="1"/>
+          </p:cNvSpPr>
+          <p:nvPr>
+            <p:ph type="title"/>
+          </p:nvPr>
+        </p:nvSpPr>
+        <p:spPr/>
+        <p:txBody>
+          <a:bodyPr/>
+          <a:lstStyle/>
+          <a:p>
+            <a:r>
+              <a:rPr lang="en-US" dirty="0"/>
+              <a:t>Solutions</a:t>
+            </a:r>
+          </a:p>
+        </p:txBody>
+      </p:sp>
+      <p:sp>
+        <p:nvSpPr>
+          <p:cNvPr id="3" name="Content Placeholder 2"/>
+          <p:cNvSpPr>
+            <a:spLocks noGrp="1"/>
+          </p:cNvSpPr>
+          <p:nvPr>
+            <p:ph idx="1"/>
+          </p:nvPr>
+        </p:nvSpPr>
+        <p:spPr/>
+        <p:txBody>
+          <a:bodyPr/>
+          <a:lstStyle/>
+          <a:p>
+            <a:r>
+              <a:rPr lang="en-US" dirty="0"/>
+              <a:t>Client </a:t>
+            </a:r>
+          </a:p>
+          <a:p>
+            <a:pPr lvl="1"/>
+            <a:r>
+              <a:rPr lang="en-US" dirty="0"/>
+              <a:t>More question asking</a:t>
+            </a:r>
+          </a:p>
+          <a:p>
+            <a:pPr lvl="1"/>
+            <a:r>
+              <a:rPr lang="en-US" dirty="0"/>
+              <a:t>Weekly meetings with client?</a:t>
+            </a:r>
+          </a:p>
+          <a:p>
+            <a:r>
+              <a:rPr lang="en-US" dirty="0"/>
+              <a:t>Team</a:t>
+            </a:r>
+          </a:p>
+          <a:p>
+            <a:pPr lvl="1"/>
+            <a:r>
+              <a:rPr lang="en-US" dirty="0"/>
+              <a:t>More planning</a:t>
+            </a:r>
+          </a:p>
+          <a:p>
+            <a:pPr lvl="2"/>
+            <a:r>
+              <a:rPr lang="en-US" dirty="0"/>
+              <a:t>Delegation?</a:t>
+            </a:r>
+          </a:p>
+          <a:p>
+            <a:pPr lvl="1"/>
+            <a:r>
+              <a:rPr lang="en-US" dirty="0"/>
+              <a:t>Weekly meetings</a:t>
+            </a:r>
+          </a:p>
+          <a:p>
+            <a:pPr lvl="1"/>
+            <a:r>
+              <a:rPr lang="en-US" dirty="0"/>
+              <a:t>Seeking help sooner</a:t>
+            </a:r>
+          </a:p>
+        </p:txBody>
+      </p:sp>
+    </p:spTree>
+    <p:extLst>
+      <p:ext uri="{BB962C8B-B14F-4D97-AF65-F5344CB8AC3E}">
+        <p14:creationId xmlns:p14="http://schemas.microsoft.com/office/powerpoint/2010/main" val="4091688379"/>
+      </p:ext>
+    </p:extLst>
+  </p:cSld>
+  <p:clrMapOvr>
+    <a:masterClrMapping/>
+  </p:clrMapOvr>
+</p:sld>
+</file>
+
+<file path=ppt/slides/slide35.xml><?xml version="1.0" encoding="utf-8"?>
+<p:sld xmlns:a="http://schemas.openxmlformats.org/drawingml/2006/main" xmlns:r="http://schemas.openxmlformats.org/officeDocument/2006/relationships" xmlns:p="http://schemas.openxmlformats.org/presentationml/2006/main">
+  <p:cSld>
+    <p:spTree>
+      <p:nvGrpSpPr>
+        <p:cNvPr id="1" name=""/>
+        <p:cNvGrpSpPr/>
+        <p:nvPr/>
+      </p:nvGrpSpPr>
+      <p:grpSpPr>
+        <a:xfrm>
+          <a:off x="0" y="0"/>
+          <a:ext cx="0" cy="0"/>
+          <a:chOff x="0" y="0"/>
+          <a:chExt cx="0" cy="0"/>
+        </a:xfrm>
+      </p:grpSpPr>
+      <p:sp>
+        <p:nvSpPr>
+          <p:cNvPr id="2" name="Title 1"/>
+          <p:cNvSpPr>
+            <a:spLocks noGrp="1"/>
+          </p:cNvSpPr>
+          <p:nvPr>
+            <p:ph type="title"/>
+          </p:nvPr>
+        </p:nvSpPr>
+        <p:spPr/>
+        <p:txBody>
+          <a:bodyPr/>
+          <a:lstStyle/>
+          <a:p>
+            <a:r>
+              <a:rPr lang="en-US" dirty="0"/>
+              <a:t>What’s next?</a:t>
+            </a:r>
+          </a:p>
+        </p:txBody>
+      </p:sp>
+      <p:sp>
+        <p:nvSpPr>
+          <p:cNvPr id="3" name="Content Placeholder 2"/>
+          <p:cNvSpPr>
+            <a:spLocks noGrp="1"/>
+          </p:cNvSpPr>
+          <p:nvPr>
+            <p:ph idx="1"/>
+          </p:nvPr>
+        </p:nvSpPr>
+        <p:spPr/>
+        <p:txBody>
+          <a:bodyPr/>
+          <a:lstStyle/>
+          <a:p>
+            <a:r>
+              <a:rPr lang="en-US" dirty="0"/>
+              <a:t>Start using API’s and Vrok.it!</a:t>
+            </a:r>
+          </a:p>
+          <a:p>
+            <a:pPr lvl="1"/>
+            <a:r>
+              <a:rPr lang="en-US" dirty="0"/>
+              <a:t>Actual code implementation?</a:t>
+            </a:r>
+          </a:p>
+          <a:p>
+            <a:pPr lvl="1"/>
+            <a:r>
+              <a:rPr lang="en-US" dirty="0"/>
+              <a:t>Might need to work out a couple details like…</a:t>
+            </a:r>
+          </a:p>
+          <a:p>
+            <a:pPr lvl="2"/>
+            <a:r>
+              <a:rPr lang="en-US" dirty="0"/>
+              <a:t>Website hosting</a:t>
+            </a:r>
+          </a:p>
+          <a:p>
+            <a:pPr lvl="2"/>
+            <a:r>
+              <a:rPr lang="en-US" dirty="0"/>
+              <a:t>Work load break up</a:t>
+            </a:r>
+          </a:p>
+          <a:p>
+            <a:pPr lvl="2"/>
+            <a:r>
+              <a:rPr lang="en-US" dirty="0"/>
+              <a:t>Reports to Patti about API usage?</a:t>
+            </a:r>
+          </a:p>
+          <a:p>
+            <a:pPr lvl="2"/>
+            <a:endParaRPr lang="en-US" dirty="0"/>
+          </a:p>
+        </p:txBody>
+      </p:sp>
+    </p:spTree>
+    <p:extLst>
+      <p:ext uri="{BB962C8B-B14F-4D97-AF65-F5344CB8AC3E}">
+        <p14:creationId xmlns:p14="http://schemas.microsoft.com/office/powerpoint/2010/main" val="2560867298"/>
+      </p:ext>
+    </p:extLst>
+  </p:cSld>
+  <p:clrMapOvr>
+    <a:masterClrMapping/>
+  </p:clrMapOvr>
+</p:sld>
+</file>
+
+<file path=ppt/slides/slide4.xml><?xml version="1.0" encoding="utf-8"?>
+<p:sld xmlns:a="http://schemas.openxmlformats.org/drawingml/2006/main" xmlns:r="http://schemas.openxmlformats.org/officeDocument/2006/relationships" xmlns:p="http://schemas.openxmlformats.org/presentationml/2006/main">
+  <p:cSld>
+    <p:spTree>
+      <p:nvGrpSpPr>
+        <p:cNvPr id="1" name=""/>
+        <p:cNvGrpSpPr/>
+        <p:nvPr/>
+      </p:nvGrpSpPr>
+      <p:grpSpPr>
+        <a:xfrm>
+          <a:off x="0" y="0"/>
+          <a:ext cx="0" cy="0"/>
+          <a:chOff x="0" y="0"/>
+          <a:chExt cx="0" cy="0"/>
+        </a:xfrm>
+      </p:grpSpPr>
+      <p:sp>
+        <p:nvSpPr>
+          <p:cNvPr id="2" name="Title 1"/>
+          <p:cNvSpPr>
+            <a:spLocks noGrp="1"/>
+          </p:cNvSpPr>
+          <p:nvPr>
+            <p:ph type="title"/>
+          </p:nvPr>
+        </p:nvSpPr>
+        <p:spPr/>
+        <p:txBody>
+          <a:bodyPr/>
+          <a:lstStyle/>
+          <a:p>
+            <a:r>
+              <a:rPr lang="en-US" dirty="0"/>
               <a:t>Overview</a:t>
             </a:r>
           </a:p>
@@ -3217,19 +6270,21 @@
           <a:p>
             <a:r>
               <a:rPr lang="en-US" dirty="0"/>
+              <a:t>Week by week break down</a:t>
+            </a:r>
+            <a:endParaRPr lang="en-US" dirty="0"/>
+          </a:p>
+          <a:p>
+            <a:r>
+              <a:rPr lang="en-US" dirty="0"/>
               <a:t>Problems &amp; Solutions</a:t>
             </a:r>
           </a:p>
           <a:p>
             <a:r>
               <a:rPr lang="en-US" dirty="0"/>
-              <a:t>Week by </a:t>
-            </a:r>
-            <a:r>
-              <a:rPr lang="en-US"/>
-              <a:t>week break down</a:t>
-            </a:r>
-            <a:endParaRPr lang="en-US" dirty="0"/>
+              <a:t>What’s next?</a:t>
+            </a:r>
           </a:p>
         </p:txBody>
       </p:sp>
@@ -3237,6 +6292,473 @@
     <p:extLst>
       <p:ext uri="{BB962C8B-B14F-4D97-AF65-F5344CB8AC3E}">
         <p14:creationId xmlns:p14="http://schemas.microsoft.com/office/powerpoint/2010/main" val="2310746045"/>
+      </p:ext>
+    </p:extLst>
+  </p:cSld>
+  <p:clrMapOvr>
+    <a:masterClrMapping/>
+  </p:clrMapOvr>
+</p:sld>
+</file>
+
+<file path=ppt/slides/slide5.xml><?xml version="1.0" encoding="utf-8"?>
+<p:sld xmlns:a="http://schemas.openxmlformats.org/drawingml/2006/main" xmlns:r="http://schemas.openxmlformats.org/officeDocument/2006/relationships" xmlns:p="http://schemas.openxmlformats.org/presentationml/2006/main">
+  <p:cSld>
+    <p:spTree>
+      <p:nvGrpSpPr>
+        <p:cNvPr id="1" name=""/>
+        <p:cNvGrpSpPr/>
+        <p:nvPr/>
+      </p:nvGrpSpPr>
+      <p:grpSpPr>
+        <a:xfrm>
+          <a:off x="0" y="0"/>
+          <a:ext cx="0" cy="0"/>
+          <a:chOff x="0" y="0"/>
+          <a:chExt cx="0" cy="0"/>
+        </a:xfrm>
+      </p:grpSpPr>
+      <p:sp>
+        <p:nvSpPr>
+          <p:cNvPr id="2" name="Title 1"/>
+          <p:cNvSpPr>
+            <a:spLocks noGrp="1"/>
+          </p:cNvSpPr>
+          <p:nvPr>
+            <p:ph type="title"/>
+          </p:nvPr>
+        </p:nvSpPr>
+        <p:spPr/>
+        <p:txBody>
+          <a:bodyPr/>
+          <a:lstStyle/>
+          <a:p>
+            <a:r>
+              <a:rPr lang="en-US" dirty="0"/>
+              <a:t>Requirements</a:t>
+            </a:r>
+          </a:p>
+        </p:txBody>
+      </p:sp>
+      <p:sp>
+        <p:nvSpPr>
+          <p:cNvPr id="3" name="Content Placeholder 2"/>
+          <p:cNvSpPr>
+            <a:spLocks noGrp="1"/>
+          </p:cNvSpPr>
+          <p:nvPr>
+            <p:ph sz="half" idx="1"/>
+          </p:nvPr>
+        </p:nvSpPr>
+        <p:spPr/>
+        <p:txBody>
+          <a:bodyPr/>
+          <a:lstStyle/>
+          <a:p>
+            <a:pPr marL="0" indent="0">
+              <a:buNone/>
+            </a:pPr>
+            <a:r>
+              <a:rPr lang="en-US" u="sng" dirty="0"/>
+              <a:t>Forge API Related</a:t>
+            </a:r>
+          </a:p>
+          <a:p>
+            <a:r>
+              <a:rPr lang="en-US" dirty="0"/>
+              <a:t>Model Viewing – Forge Viewer</a:t>
+            </a:r>
+          </a:p>
+          <a:p>
+            <a:r>
+              <a:rPr lang="en-US" dirty="0"/>
+              <a:t>Authentication</a:t>
+            </a:r>
+          </a:p>
+          <a:p>
+            <a:r>
+              <a:rPr lang="en-US" dirty="0"/>
+              <a:t>Data Management</a:t>
+            </a:r>
+          </a:p>
+          <a:p>
+            <a:r>
+              <a:rPr lang="en-US" dirty="0"/>
+              <a:t>Model Derivative</a:t>
+            </a:r>
+          </a:p>
+          <a:p>
+            <a:endParaRPr lang="en-US" dirty="0"/>
+          </a:p>
+        </p:txBody>
+      </p:sp>
+      <p:sp>
+        <p:nvSpPr>
+          <p:cNvPr id="4" name="Content Placeholder 3"/>
+          <p:cNvSpPr>
+            <a:spLocks noGrp="1"/>
+          </p:cNvSpPr>
+          <p:nvPr>
+            <p:ph sz="half" idx="2"/>
+          </p:nvPr>
+        </p:nvSpPr>
+        <p:spPr/>
+        <p:txBody>
+          <a:bodyPr/>
+          <a:lstStyle/>
+          <a:p>
+            <a:pPr marL="0" indent="0">
+              <a:buNone/>
+            </a:pPr>
+            <a:r>
+              <a:rPr lang="en-US" u="sng" dirty="0"/>
+              <a:t>Non-related</a:t>
+            </a:r>
+          </a:p>
+          <a:p>
+            <a:r>
+              <a:rPr lang="en-US" dirty="0"/>
+              <a:t>File upload</a:t>
+            </a:r>
+          </a:p>
+          <a:p>
+            <a:r>
+              <a:rPr lang="en-US" dirty="0"/>
+              <a:t>Smartphone Connection</a:t>
+            </a:r>
+          </a:p>
+          <a:p>
+            <a:r>
+              <a:rPr lang="en-US" dirty="0"/>
+              <a:t>VR Device Support</a:t>
+            </a:r>
+          </a:p>
+        </p:txBody>
+      </p:sp>
+    </p:spTree>
+    <p:extLst>
+      <p:ext uri="{BB962C8B-B14F-4D97-AF65-F5344CB8AC3E}">
+        <p14:creationId xmlns:p14="http://schemas.microsoft.com/office/powerpoint/2010/main" val="1579341955"/>
+      </p:ext>
+    </p:extLst>
+  </p:cSld>
+  <p:clrMapOvr>
+    <a:masterClrMapping/>
+  </p:clrMapOvr>
+</p:sld>
+</file>
+
+<file path=ppt/slides/slide6.xml><?xml version="1.0" encoding="utf-8"?>
+<p:sld xmlns:a="http://schemas.openxmlformats.org/drawingml/2006/main" xmlns:r="http://schemas.openxmlformats.org/officeDocument/2006/relationships" xmlns:p="http://schemas.openxmlformats.org/presentationml/2006/main">
+  <p:cSld>
+    <p:spTree>
+      <p:nvGrpSpPr>
+        <p:cNvPr id="1" name=""/>
+        <p:cNvGrpSpPr/>
+        <p:nvPr/>
+      </p:nvGrpSpPr>
+      <p:grpSpPr>
+        <a:xfrm>
+          <a:off x="0" y="0"/>
+          <a:ext cx="0" cy="0"/>
+          <a:chOff x="0" y="0"/>
+          <a:chExt cx="0" cy="0"/>
+        </a:xfrm>
+      </p:grpSpPr>
+      <p:sp>
+        <p:nvSpPr>
+          <p:cNvPr id="2" name="Title 1"/>
+          <p:cNvSpPr>
+            <a:spLocks noGrp="1"/>
+          </p:cNvSpPr>
+          <p:nvPr>
+            <p:ph type="title"/>
+          </p:nvPr>
+        </p:nvSpPr>
+        <p:spPr/>
+        <p:txBody>
+          <a:bodyPr/>
+          <a:lstStyle/>
+          <a:p>
+            <a:r>
+              <a:rPr lang="en-US" dirty="0"/>
+              <a:t>Forge VR Explorer Functionality</a:t>
+            </a:r>
+          </a:p>
+        </p:txBody>
+      </p:sp>
+      <p:sp>
+        <p:nvSpPr>
+          <p:cNvPr id="3" name="Content Placeholder 2"/>
+          <p:cNvSpPr>
+            <a:spLocks noGrp="1"/>
+          </p:cNvSpPr>
+          <p:nvPr>
+            <p:ph idx="1"/>
+          </p:nvPr>
+        </p:nvSpPr>
+        <p:spPr/>
+        <p:txBody>
+          <a:bodyPr/>
+          <a:lstStyle/>
+          <a:p>
+            <a:r>
+              <a:rPr lang="en-US" dirty="0"/>
+              <a:t>User can choose a CAD model locally or through Data Management</a:t>
+            </a:r>
+          </a:p>
+          <a:p>
+            <a:r>
+              <a:rPr lang="en-US" dirty="0"/>
+              <a:t>3D model is shown through Forge Viewer</a:t>
+            </a:r>
+          </a:p>
+          <a:p>
+            <a:r>
+              <a:rPr lang="en-US" dirty="0"/>
+              <a:t>Connect to website with smartphone (via QR scanner)</a:t>
+            </a:r>
+          </a:p>
+          <a:p>
+            <a:r>
+              <a:rPr lang="en-US" dirty="0"/>
+              <a:t>Model can be viewed on phone normally or through Google Cardboard</a:t>
+            </a:r>
+          </a:p>
+          <a:p>
+            <a:r>
+              <a:rPr lang="en-US" dirty="0"/>
+              <a:t>Viewable model has interactivity</a:t>
+            </a:r>
+          </a:p>
+        </p:txBody>
+      </p:sp>
+    </p:spTree>
+    <p:extLst>
+      <p:ext uri="{BB962C8B-B14F-4D97-AF65-F5344CB8AC3E}">
+        <p14:creationId xmlns:p14="http://schemas.microsoft.com/office/powerpoint/2010/main" val="716035048"/>
+      </p:ext>
+    </p:extLst>
+  </p:cSld>
+  <p:clrMapOvr>
+    <a:masterClrMapping/>
+  </p:clrMapOvr>
+</p:sld>
+</file>
+
+<file path=ppt/slides/slide7.xml><?xml version="1.0" encoding="utf-8"?>
+<p:sld xmlns:a="http://schemas.openxmlformats.org/drawingml/2006/main" xmlns:r="http://schemas.openxmlformats.org/officeDocument/2006/relationships" xmlns:p="http://schemas.openxmlformats.org/presentationml/2006/main">
+  <p:cSld>
+    <p:spTree>
+      <p:nvGrpSpPr>
+        <p:cNvPr id="1" name=""/>
+        <p:cNvGrpSpPr/>
+        <p:nvPr/>
+      </p:nvGrpSpPr>
+      <p:grpSpPr>
+        <a:xfrm>
+          <a:off x="0" y="0"/>
+          <a:ext cx="0" cy="0"/>
+          <a:chOff x="0" y="0"/>
+          <a:chExt cx="0" cy="0"/>
+        </a:xfrm>
+      </p:grpSpPr>
+      <p:sp>
+        <p:nvSpPr>
+          <p:cNvPr id="2" name="Title 1"/>
+          <p:cNvSpPr>
+            <a:spLocks noGrp="1"/>
+          </p:cNvSpPr>
+          <p:nvPr>
+            <p:ph type="title"/>
+          </p:nvPr>
+        </p:nvSpPr>
+        <p:spPr/>
+        <p:txBody>
+          <a:bodyPr/>
+          <a:lstStyle/>
+          <a:p>
+            <a:r>
+              <a:rPr lang="en-US" dirty="0"/>
+              <a:t>Software Interfaces</a:t>
+            </a:r>
+          </a:p>
+        </p:txBody>
+      </p:sp>
+      <p:sp>
+        <p:nvSpPr>
+          <p:cNvPr id="3" name="Content Placeholder 2"/>
+          <p:cNvSpPr>
+            <a:spLocks noGrp="1"/>
+          </p:cNvSpPr>
+          <p:nvPr>
+            <p:ph idx="1"/>
+          </p:nvPr>
+        </p:nvSpPr>
+        <p:spPr/>
+        <p:txBody>
+          <a:bodyPr/>
+          <a:lstStyle/>
+          <a:p>
+            <a:endParaRPr lang="en-US"/>
+          </a:p>
+        </p:txBody>
+      </p:sp>
+    </p:spTree>
+    <p:extLst>
+      <p:ext uri="{BB962C8B-B14F-4D97-AF65-F5344CB8AC3E}">
+        <p14:creationId xmlns:p14="http://schemas.microsoft.com/office/powerpoint/2010/main" val="1216246470"/>
+      </p:ext>
+    </p:extLst>
+  </p:cSld>
+  <p:clrMapOvr>
+    <a:masterClrMapping/>
+  </p:clrMapOvr>
+</p:sld>
+</file>
+
+<file path=ppt/slides/slide8.xml><?xml version="1.0" encoding="utf-8"?>
+<p:sld xmlns:a="http://schemas.openxmlformats.org/drawingml/2006/main" xmlns:r="http://schemas.openxmlformats.org/officeDocument/2006/relationships" xmlns:p="http://schemas.openxmlformats.org/presentationml/2006/main">
+  <p:cSld>
+    <p:spTree>
+      <p:nvGrpSpPr>
+        <p:cNvPr id="1" name=""/>
+        <p:cNvGrpSpPr/>
+        <p:nvPr/>
+      </p:nvGrpSpPr>
+      <p:grpSpPr>
+        <a:xfrm>
+          <a:off x="0" y="0"/>
+          <a:ext cx="0" cy="0"/>
+          <a:chOff x="0" y="0"/>
+          <a:chExt cx="0" cy="0"/>
+        </a:xfrm>
+      </p:grpSpPr>
+      <p:sp>
+        <p:nvSpPr>
+          <p:cNvPr id="2" name="Title 1"/>
+          <p:cNvSpPr>
+            <a:spLocks noGrp="1"/>
+          </p:cNvSpPr>
+          <p:nvPr>
+            <p:ph type="title"/>
+          </p:nvPr>
+        </p:nvSpPr>
+        <p:spPr/>
+        <p:txBody>
+          <a:bodyPr/>
+          <a:lstStyle/>
+          <a:p>
+            <a:r>
+              <a:rPr lang="en-US" dirty="0"/>
+              <a:t>User Interfaces</a:t>
+            </a:r>
+          </a:p>
+        </p:txBody>
+      </p:sp>
+      <p:sp>
+        <p:nvSpPr>
+          <p:cNvPr id="3" name="Content Placeholder 2"/>
+          <p:cNvSpPr>
+            <a:spLocks noGrp="1"/>
+          </p:cNvSpPr>
+          <p:nvPr>
+            <p:ph idx="1"/>
+          </p:nvPr>
+        </p:nvSpPr>
+        <p:spPr/>
+        <p:txBody>
+          <a:bodyPr/>
+          <a:lstStyle/>
+          <a:p>
+            <a:endParaRPr lang="en-US"/>
+          </a:p>
+        </p:txBody>
+      </p:sp>
+    </p:spTree>
+    <p:extLst>
+      <p:ext uri="{BB962C8B-B14F-4D97-AF65-F5344CB8AC3E}">
+        <p14:creationId xmlns:p14="http://schemas.microsoft.com/office/powerpoint/2010/main" val="3827932349"/>
+      </p:ext>
+    </p:extLst>
+  </p:cSld>
+  <p:clrMapOvr>
+    <a:masterClrMapping/>
+  </p:clrMapOvr>
+</p:sld>
+</file>
+
+<file path=ppt/slides/slide9.xml><?xml version="1.0" encoding="utf-8"?>
+<p:sld xmlns:a="http://schemas.openxmlformats.org/drawingml/2006/main" xmlns:r="http://schemas.openxmlformats.org/officeDocument/2006/relationships" xmlns:p="http://schemas.openxmlformats.org/presentationml/2006/main">
+  <p:cSld>
+    <p:spTree>
+      <p:nvGrpSpPr>
+        <p:cNvPr id="1" name=""/>
+        <p:cNvGrpSpPr/>
+        <p:nvPr/>
+      </p:nvGrpSpPr>
+      <p:grpSpPr>
+        <a:xfrm>
+          <a:off x="0" y="0"/>
+          <a:ext cx="0" cy="0"/>
+          <a:chOff x="0" y="0"/>
+          <a:chExt cx="0" cy="0"/>
+        </a:xfrm>
+      </p:grpSpPr>
+      <p:sp>
+        <p:nvSpPr>
+          <p:cNvPr id="2" name="Title 1"/>
+          <p:cNvSpPr>
+            <a:spLocks noGrp="1"/>
+          </p:cNvSpPr>
+          <p:nvPr>
+            <p:ph type="title"/>
+          </p:nvPr>
+        </p:nvSpPr>
+        <p:spPr/>
+        <p:txBody>
+          <a:bodyPr/>
+          <a:lstStyle/>
+          <a:p>
+            <a:r>
+              <a:rPr lang="en-US" dirty="0"/>
+              <a:t>Authentication Requirements</a:t>
+            </a:r>
+          </a:p>
+        </p:txBody>
+      </p:sp>
+      <p:sp>
+        <p:nvSpPr>
+          <p:cNvPr id="3" name="Content Placeholder 2"/>
+          <p:cNvSpPr>
+            <a:spLocks noGrp="1"/>
+          </p:cNvSpPr>
+          <p:nvPr>
+            <p:ph idx="1"/>
+          </p:nvPr>
+        </p:nvSpPr>
+        <p:spPr/>
+        <p:txBody>
+          <a:bodyPr/>
+          <a:lstStyle/>
+          <a:p>
+            <a:r>
+              <a:rPr lang="en-US" dirty="0"/>
+              <a:t>Security for users</a:t>
+            </a:r>
+          </a:p>
+          <a:p>
+            <a:r>
+              <a:rPr lang="en-US" dirty="0"/>
+              <a:t>Token created for users</a:t>
+            </a:r>
+          </a:p>
+        </p:txBody>
+      </p:sp>
+    </p:spTree>
+    <p:extLst>
+      <p:ext uri="{BB962C8B-B14F-4D97-AF65-F5344CB8AC3E}">
+        <p14:creationId xmlns:p14="http://schemas.microsoft.com/office/powerpoint/2010/main" val="922885700"/>
       </p:ext>
     </p:extLst>
   </p:cSld>

</xml_diff>

<commit_message>
Tweaked order of slides, added references
</commit_message>
<xml_diff>
--- a/Progress Report/Progress report.pptx
+++ b/Progress Report/Progress report.pptx
@@ -14,21 +14,21 @@
     <p:sldId id="286" r:id="rId8"/>
     <p:sldId id="287" r:id="rId9"/>
     <p:sldId id="261" r:id="rId10"/>
-    <p:sldId id="262" r:id="rId11"/>
-    <p:sldId id="263" r:id="rId12"/>
-    <p:sldId id="264" r:id="rId13"/>
-    <p:sldId id="265" r:id="rId14"/>
-    <p:sldId id="266" r:id="rId15"/>
-    <p:sldId id="267" r:id="rId16"/>
+    <p:sldId id="263" r:id="rId11"/>
+    <p:sldId id="266" r:id="rId12"/>
+    <p:sldId id="265" r:id="rId13"/>
+    <p:sldId id="267" r:id="rId14"/>
+    <p:sldId id="262" r:id="rId15"/>
+    <p:sldId id="264" r:id="rId16"/>
     <p:sldId id="291" r:id="rId17"/>
-    <p:sldId id="269" r:id="rId18"/>
-    <p:sldId id="270" r:id="rId19"/>
+    <p:sldId id="270" r:id="rId18"/>
+    <p:sldId id="269" r:id="rId19"/>
     <p:sldId id="288" r:id="rId20"/>
-    <p:sldId id="271" r:id="rId21"/>
-    <p:sldId id="272" r:id="rId22"/>
-    <p:sldId id="273" r:id="rId23"/>
-    <p:sldId id="289" r:id="rId24"/>
-    <p:sldId id="274" r:id="rId25"/>
+    <p:sldId id="274" r:id="rId21"/>
+    <p:sldId id="271" r:id="rId22"/>
+    <p:sldId id="272" r:id="rId23"/>
+    <p:sldId id="273" r:id="rId24"/>
+    <p:sldId id="289" r:id="rId25"/>
     <p:sldId id="277" r:id="rId26"/>
     <p:sldId id="278" r:id="rId27"/>
     <p:sldId id="279" r:id="rId28"/>
@@ -40,6 +40,7 @@
     <p:sldId id="293" r:id="rId34"/>
     <p:sldId id="294" r:id="rId35"/>
     <p:sldId id="276" r:id="rId36"/>
+    <p:sldId id="295" r:id="rId37"/>
   </p:sldIdLst>
   <p:sldSz cx="12192000" cy="6858000"/>
   <p:notesSz cx="6858000" cy="9144000"/>
@@ -275,7 +276,7 @@
           <a:p>
             <a:fld id="{B17AFAAB-B546-45EA-83F1-D6961F00B077}" type="datetimeFigureOut">
               <a:rPr lang="en-US" smtClean="0"/>
-              <a:t>12/4/2016</a:t>
+              <a:t>12/5/2016</a:t>
             </a:fld>
             <a:endParaRPr lang="en-US"/>
           </a:p>
@@ -443,7 +444,7 @@
           <a:p>
             <a:fld id="{B17AFAAB-B546-45EA-83F1-D6961F00B077}" type="datetimeFigureOut">
               <a:rPr lang="en-US" smtClean="0"/>
-              <a:t>12/4/2016</a:t>
+              <a:t>12/5/2016</a:t>
             </a:fld>
             <a:endParaRPr lang="en-US"/>
           </a:p>
@@ -621,7 +622,7 @@
           <a:p>
             <a:fld id="{B17AFAAB-B546-45EA-83F1-D6961F00B077}" type="datetimeFigureOut">
               <a:rPr lang="en-US" smtClean="0"/>
-              <a:t>12/4/2016</a:t>
+              <a:t>12/5/2016</a:t>
             </a:fld>
             <a:endParaRPr lang="en-US"/>
           </a:p>
@@ -789,7 +790,7 @@
           <a:p>
             <a:fld id="{B17AFAAB-B546-45EA-83F1-D6961F00B077}" type="datetimeFigureOut">
               <a:rPr lang="en-US" smtClean="0"/>
-              <a:t>12/4/2016</a:t>
+              <a:t>12/5/2016</a:t>
             </a:fld>
             <a:endParaRPr lang="en-US"/>
           </a:p>
@@ -1034,7 +1035,7 @@
           <a:p>
             <a:fld id="{B17AFAAB-B546-45EA-83F1-D6961F00B077}" type="datetimeFigureOut">
               <a:rPr lang="en-US" smtClean="0"/>
-              <a:t>12/4/2016</a:t>
+              <a:t>12/5/2016</a:t>
             </a:fld>
             <a:endParaRPr lang="en-US"/>
           </a:p>
@@ -1263,7 +1264,7 @@
           <a:p>
             <a:fld id="{B17AFAAB-B546-45EA-83F1-D6961F00B077}" type="datetimeFigureOut">
               <a:rPr lang="en-US" smtClean="0"/>
-              <a:t>12/4/2016</a:t>
+              <a:t>12/5/2016</a:t>
             </a:fld>
             <a:endParaRPr lang="en-US"/>
           </a:p>
@@ -1627,7 +1628,7 @@
           <a:p>
             <a:fld id="{B17AFAAB-B546-45EA-83F1-D6961F00B077}" type="datetimeFigureOut">
               <a:rPr lang="en-US" smtClean="0"/>
-              <a:t>12/4/2016</a:t>
+              <a:t>12/5/2016</a:t>
             </a:fld>
             <a:endParaRPr lang="en-US"/>
           </a:p>
@@ -1744,7 +1745,7 @@
           <a:p>
             <a:fld id="{B17AFAAB-B546-45EA-83F1-D6961F00B077}" type="datetimeFigureOut">
               <a:rPr lang="en-US" smtClean="0"/>
-              <a:t>12/4/2016</a:t>
+              <a:t>12/5/2016</a:t>
             </a:fld>
             <a:endParaRPr lang="en-US"/>
           </a:p>
@@ -1839,7 +1840,7 @@
           <a:p>
             <a:fld id="{B17AFAAB-B546-45EA-83F1-D6961F00B077}" type="datetimeFigureOut">
               <a:rPr lang="en-US" smtClean="0"/>
-              <a:t>12/4/2016</a:t>
+              <a:t>12/5/2016</a:t>
             </a:fld>
             <a:endParaRPr lang="en-US"/>
           </a:p>
@@ -2114,7 +2115,7 @@
           <a:p>
             <a:fld id="{B17AFAAB-B546-45EA-83F1-D6961F00B077}" type="datetimeFigureOut">
               <a:rPr lang="en-US" smtClean="0"/>
-              <a:t>12/4/2016</a:t>
+              <a:t>12/5/2016</a:t>
             </a:fld>
             <a:endParaRPr lang="en-US"/>
           </a:p>
@@ -2366,7 +2367,7 @@
           <a:p>
             <a:fld id="{B17AFAAB-B546-45EA-83F1-D6961F00B077}" type="datetimeFigureOut">
               <a:rPr lang="en-US" smtClean="0"/>
-              <a:t>12/4/2016</a:t>
+              <a:t>12/5/2016</a:t>
             </a:fld>
             <a:endParaRPr lang="en-US"/>
           </a:p>
@@ -2577,7 +2578,7 @@
           <a:p>
             <a:fld id="{B17AFAAB-B546-45EA-83F1-D6961F00B077}" type="datetimeFigureOut">
               <a:rPr lang="en-US" smtClean="0"/>
-              <a:t>12/4/2016</a:t>
+              <a:t>12/5/2016</a:t>
             </a:fld>
             <a:endParaRPr lang="en-US"/>
           </a:p>
@@ -3095,7 +3096,7 @@
           <a:p>
             <a:r>
               <a:rPr lang="en-US" dirty="0"/>
-              <a:t>Data Management Requirements</a:t>
+              <a:t>Viewing VR Requirements</a:t>
             </a:r>
           </a:p>
         </p:txBody>
@@ -3117,19 +3118,19 @@
           <a:p>
             <a:r>
               <a:rPr lang="en-US" dirty="0"/>
-              <a:t>Users with files in A360 should be able to use in site</a:t>
-            </a:r>
-          </a:p>
-          <a:p>
-            <a:r>
-              <a:rPr lang="en-US" dirty="0"/>
-              <a:t>User gives website permission to use files</a:t>
-            </a:r>
-          </a:p>
-          <a:p>
-            <a:r>
-              <a:rPr lang="en-US" dirty="0"/>
-              <a:t>User can now choose file to view</a:t>
+              <a:t>Model is viewable in VR headset (Google Cardboard)</a:t>
+            </a:r>
+          </a:p>
+          <a:p>
+            <a:r>
+              <a:rPr lang="en-US" dirty="0"/>
+              <a:t>High quality/size models will be hard to view</a:t>
+            </a:r>
+          </a:p>
+          <a:p>
+            <a:r>
+              <a:rPr lang="en-US" dirty="0"/>
+              <a:t>Models need some interactivity while user uses VR</a:t>
             </a:r>
           </a:p>
         </p:txBody>
@@ -3137,7 +3138,7 @@
     </p:spTree>
     <p:extLst>
       <p:ext uri="{BB962C8B-B14F-4D97-AF65-F5344CB8AC3E}">
-        <p14:creationId xmlns:p14="http://schemas.microsoft.com/office/powerpoint/2010/main" val="4073836856"/>
+        <p14:creationId xmlns:p14="http://schemas.microsoft.com/office/powerpoint/2010/main" val="618129479"/>
       </p:ext>
     </p:extLst>
   </p:cSld>
@@ -3181,7 +3182,7 @@
           <a:p>
             <a:r>
               <a:rPr lang="en-US" dirty="0"/>
-              <a:t>Viewing VR Requirements</a:t>
+              <a:t>File Upload Requirements</a:t>
             </a:r>
           </a:p>
         </p:txBody>
@@ -3203,19 +3204,47 @@
           <a:p>
             <a:r>
               <a:rPr lang="en-US" dirty="0"/>
-              <a:t>Model is viewable in VR headset (Google Cardboard)</a:t>
-            </a:r>
-          </a:p>
-          <a:p>
-            <a:r>
-              <a:rPr lang="en-US" dirty="0"/>
-              <a:t>High quality/size models will be hard to view</a:t>
-            </a:r>
-          </a:p>
-          <a:p>
-            <a:r>
-              <a:rPr lang="en-US" dirty="0"/>
-              <a:t>Models need some interactivity while user uses VR</a:t>
+              <a:t>User can upload files</a:t>
+            </a:r>
+          </a:p>
+          <a:p>
+            <a:pPr lvl="1"/>
+            <a:r>
+              <a:rPr lang="en-US" dirty="0"/>
+              <a:t>Through local machine</a:t>
+            </a:r>
+          </a:p>
+          <a:p>
+            <a:pPr lvl="1"/>
+            <a:r>
+              <a:rPr lang="en-US" dirty="0"/>
+              <a:t>Or A360 (Data Management API)</a:t>
+            </a:r>
+          </a:p>
+          <a:p>
+            <a:r>
+              <a:rPr lang="en-US" dirty="0"/>
+              <a:t>Failures will be reported</a:t>
+            </a:r>
+          </a:p>
+          <a:p>
+            <a:pPr lvl="1"/>
+            <a:r>
+              <a:rPr lang="en-US" dirty="0"/>
+              <a:t>Unsuccessful upload</a:t>
+            </a:r>
+          </a:p>
+          <a:p>
+            <a:pPr lvl="1"/>
+            <a:r>
+              <a:rPr lang="en-US" dirty="0"/>
+              <a:t>Too large</a:t>
+            </a:r>
+          </a:p>
+          <a:p>
+            <a:r>
+              <a:rPr lang="en-US" dirty="0"/>
+              <a:t>File will be displayed on list of usable models</a:t>
             </a:r>
           </a:p>
         </p:txBody>
@@ -3223,7 +3252,7 @@
     </p:spTree>
     <p:extLst>
       <p:ext uri="{BB962C8B-B14F-4D97-AF65-F5344CB8AC3E}">
-        <p14:creationId xmlns:p14="http://schemas.microsoft.com/office/powerpoint/2010/main" val="618129479"/>
+        <p14:creationId xmlns:p14="http://schemas.microsoft.com/office/powerpoint/2010/main" val="4186160874"/>
       </p:ext>
     </p:extLst>
   </p:cSld>
@@ -3267,7 +3296,7 @@
           <a:p>
             <a:r>
               <a:rPr lang="en-US" dirty="0"/>
-              <a:t>Model View Requirements</a:t>
+              <a:t>Model Derivative Requirements</a:t>
             </a:r>
           </a:p>
         </p:txBody>
@@ -3289,26 +3318,19 @@
           <a:p>
             <a:r>
               <a:rPr lang="en-US" dirty="0"/>
-              <a:t>User can see chosen model on website</a:t>
-            </a:r>
-          </a:p>
-          <a:p>
-            <a:r>
-              <a:rPr lang="en-US" dirty="0"/>
-              <a:t>Model cannot be too detailed or large</a:t>
-            </a:r>
-          </a:p>
-          <a:p>
-            <a:pPr lvl="1"/>
-            <a:r>
-              <a:rPr lang="en-US" dirty="0"/>
-              <a:t>Where the website cannot run it</a:t>
-            </a:r>
-          </a:p>
-          <a:p>
-            <a:r>
-              <a:rPr lang="en-US" dirty="0"/>
-              <a:t>Model is displayed in Forge Viewer and is interactive</a:t>
+              <a:t>Files user uploads will be converted to SVF files</a:t>
+            </a:r>
+          </a:p>
+          <a:p>
+            <a:r>
+              <a:rPr lang="en-US" dirty="0"/>
+              <a:t>Then the file will be displayed on viewer</a:t>
+            </a:r>
+          </a:p>
+          <a:p>
+            <a:r>
+              <a:rPr lang="en-US" dirty="0"/>
+              <a:t>Should notify user of any failures</a:t>
             </a:r>
           </a:p>
         </p:txBody>
@@ -3316,7 +3338,7 @@
     </p:spTree>
     <p:extLst>
       <p:ext uri="{BB962C8B-B14F-4D97-AF65-F5344CB8AC3E}">
-        <p14:creationId xmlns:p14="http://schemas.microsoft.com/office/powerpoint/2010/main" val="181090165"/>
+        <p14:creationId xmlns:p14="http://schemas.microsoft.com/office/powerpoint/2010/main" val="4239687670"/>
       </p:ext>
     </p:extLst>
   </p:cSld>
@@ -3360,7 +3382,7 @@
           <a:p>
             <a:r>
               <a:rPr lang="en-US" dirty="0"/>
-              <a:t>Model Derivative Requirements</a:t>
+              <a:t>Smartphone Connection Requirements</a:t>
             </a:r>
           </a:p>
         </p:txBody>
@@ -3382,27 +3404,36 @@
           <a:p>
             <a:r>
               <a:rPr lang="en-US" dirty="0"/>
-              <a:t>Files user uploads will be converted to SVF files</a:t>
-            </a:r>
-          </a:p>
-          <a:p>
-            <a:r>
-              <a:rPr lang="en-US" dirty="0"/>
-              <a:t>Then the file will be displayed on viewer</a:t>
-            </a:r>
-          </a:p>
-          <a:p>
-            <a:r>
-              <a:rPr lang="en-US" dirty="0"/>
-              <a:t>Should notify user of any failures</a:t>
-            </a:r>
+              <a:t>Users connect phone to Vrok.it</a:t>
+            </a:r>
+          </a:p>
+          <a:p>
+            <a:r>
+              <a:rPr lang="en-US" dirty="0"/>
+              <a:t>So user can view model in VR environment</a:t>
+            </a:r>
+          </a:p>
+          <a:p>
+            <a:r>
+              <a:rPr lang="en-US" dirty="0"/>
+              <a:t>Users device must have QR scanner and internet</a:t>
+            </a:r>
+          </a:p>
+          <a:p>
+            <a:r>
+              <a:rPr lang="en-US" dirty="0"/>
+              <a:t>Phone should connect to site via QR scan</a:t>
+            </a:r>
+          </a:p>
+          <a:p>
+            <a:endParaRPr lang="en-US" dirty="0"/>
           </a:p>
         </p:txBody>
       </p:sp>
     </p:spTree>
     <p:extLst>
       <p:ext uri="{BB962C8B-B14F-4D97-AF65-F5344CB8AC3E}">
-        <p14:creationId xmlns:p14="http://schemas.microsoft.com/office/powerpoint/2010/main" val="4239687670"/>
+        <p14:creationId xmlns:p14="http://schemas.microsoft.com/office/powerpoint/2010/main" val="1717661036"/>
       </p:ext>
     </p:extLst>
   </p:cSld>
@@ -3446,7 +3477,7 @@
           <a:p>
             <a:r>
               <a:rPr lang="en-US" dirty="0"/>
-              <a:t>File Upload Requirements</a:t>
+              <a:t>Data Management Requirements</a:t>
             </a:r>
           </a:p>
         </p:txBody>
@@ -3468,47 +3499,19 @@
           <a:p>
             <a:r>
               <a:rPr lang="en-US" dirty="0"/>
-              <a:t>User can upload files</a:t>
-            </a:r>
-          </a:p>
-          <a:p>
-            <a:pPr lvl="1"/>
-            <a:r>
-              <a:rPr lang="en-US" dirty="0"/>
-              <a:t>Through local machine</a:t>
-            </a:r>
-          </a:p>
-          <a:p>
-            <a:pPr lvl="1"/>
-            <a:r>
-              <a:rPr lang="en-US" dirty="0"/>
-              <a:t>Or A360 (Data Management API)</a:t>
-            </a:r>
-          </a:p>
-          <a:p>
-            <a:r>
-              <a:rPr lang="en-US" dirty="0"/>
-              <a:t>Failures will be reported</a:t>
-            </a:r>
-          </a:p>
-          <a:p>
-            <a:pPr lvl="1"/>
-            <a:r>
-              <a:rPr lang="en-US" dirty="0"/>
-              <a:t>Unsuccessful upload</a:t>
-            </a:r>
-          </a:p>
-          <a:p>
-            <a:pPr lvl="1"/>
-            <a:r>
-              <a:rPr lang="en-US" dirty="0"/>
-              <a:t>Too large</a:t>
-            </a:r>
-          </a:p>
-          <a:p>
-            <a:r>
-              <a:rPr lang="en-US" dirty="0"/>
-              <a:t>File will be displayed on list of usable models</a:t>
+              <a:t>Users with files in A360 should be able to use in site</a:t>
+            </a:r>
+          </a:p>
+          <a:p>
+            <a:r>
+              <a:rPr lang="en-US" dirty="0"/>
+              <a:t>User gives website permission to use files</a:t>
+            </a:r>
+          </a:p>
+          <a:p>
+            <a:r>
+              <a:rPr lang="en-US" dirty="0"/>
+              <a:t>User can now choose file to view</a:t>
             </a:r>
           </a:p>
         </p:txBody>
@@ -3516,7 +3519,7 @@
     </p:spTree>
     <p:extLst>
       <p:ext uri="{BB962C8B-B14F-4D97-AF65-F5344CB8AC3E}">
-        <p14:creationId xmlns:p14="http://schemas.microsoft.com/office/powerpoint/2010/main" val="4186160874"/>
+        <p14:creationId xmlns:p14="http://schemas.microsoft.com/office/powerpoint/2010/main" val="4073836856"/>
       </p:ext>
     </p:extLst>
   </p:cSld>
@@ -3560,7 +3563,7 @@
           <a:p>
             <a:r>
               <a:rPr lang="en-US" dirty="0"/>
-              <a:t>Smartphone Connection Requirements</a:t>
+              <a:t>Model View Requirements</a:t>
             </a:r>
           </a:p>
         </p:txBody>
@@ -3582,36 +3585,34 @@
           <a:p>
             <a:r>
               <a:rPr lang="en-US" dirty="0"/>
-              <a:t>Users connect phone to Vrok.it</a:t>
-            </a:r>
-          </a:p>
-          <a:p>
-            <a:r>
-              <a:rPr lang="en-US" dirty="0"/>
-              <a:t>So user can view model in VR environment</a:t>
-            </a:r>
-          </a:p>
-          <a:p>
-            <a:r>
-              <a:rPr lang="en-US" dirty="0"/>
-              <a:t>Users device must have QR scanner and internet</a:t>
-            </a:r>
-          </a:p>
-          <a:p>
-            <a:r>
-              <a:rPr lang="en-US" dirty="0"/>
-              <a:t>Phone should connect to site via QR scan</a:t>
-            </a:r>
-          </a:p>
-          <a:p>
-            <a:endParaRPr lang="en-US" dirty="0"/>
+              <a:t>User can see chosen model on website</a:t>
+            </a:r>
+          </a:p>
+          <a:p>
+            <a:r>
+              <a:rPr lang="en-US" dirty="0"/>
+              <a:t>Model cannot be too detailed or large</a:t>
+            </a:r>
+          </a:p>
+          <a:p>
+            <a:pPr lvl="1"/>
+            <a:r>
+              <a:rPr lang="en-US" dirty="0"/>
+              <a:t>Where the website cannot run it</a:t>
+            </a:r>
+          </a:p>
+          <a:p>
+            <a:r>
+              <a:rPr lang="en-US" dirty="0"/>
+              <a:t>Model is displayed in Forge Viewer and is interactive</a:t>
+            </a:r>
           </a:p>
         </p:txBody>
       </p:sp>
     </p:spTree>
     <p:extLst>
       <p:ext uri="{BB962C8B-B14F-4D97-AF65-F5344CB8AC3E}">
-        <p14:creationId xmlns:p14="http://schemas.microsoft.com/office/powerpoint/2010/main" val="1717661036"/>
+        <p14:creationId xmlns:p14="http://schemas.microsoft.com/office/powerpoint/2010/main" val="181090165"/>
       </p:ext>
     </p:extLst>
   </p:cSld>
@@ -3657,7 +3658,6 @@
               <a:rPr lang="en-US" dirty="0"/>
               <a:t>Authentication Design</a:t>
             </a:r>
-            <a:endParaRPr lang="en-US" dirty="0"/>
           </a:p>
         </p:txBody>
       </p:sp>
@@ -3856,7 +3856,7 @@
           <a:p>
             <a:r>
               <a:rPr lang="en-US" dirty="0"/>
-              <a:t>Data Management Design</a:t>
+              <a:t>Viewing VR Design</a:t>
             </a:r>
           </a:p>
         </p:txBody>
@@ -3878,19 +3878,55 @@
           <a:p>
             <a:r>
               <a:rPr lang="en-US" dirty="0"/>
-              <a:t>Relies on 3 Legged Data Authentication being completed</a:t>
-            </a:r>
-          </a:p>
-          <a:p>
-            <a:r>
-              <a:rPr lang="en-US" dirty="0"/>
-              <a:t>User accesses files stored in A360 to use</a:t>
-            </a:r>
-          </a:p>
-          <a:p>
-            <a:r>
-              <a:rPr lang="en-US" dirty="0"/>
-              <a:t>Data management returns those files</a:t>
+              <a:t>Currently using Google Cardboard’s application</a:t>
+            </a:r>
+          </a:p>
+          <a:p>
+            <a:pPr lvl="1"/>
+            <a:r>
+              <a:rPr lang="en-US" dirty="0"/>
+              <a:t>Android WebView inside the application (</a:t>
+            </a:r>
+            <a:r>
+              <a:rPr lang="en-US" dirty="0" err="1"/>
+              <a:t>WebGL</a:t>
+            </a:r>
+            <a:r>
+              <a:rPr lang="en-US" dirty="0"/>
+              <a:t>)</a:t>
+            </a:r>
+          </a:p>
+          <a:p>
+            <a:r>
+              <a:rPr lang="en-US" dirty="0"/>
+              <a:t>This allows for VR viewing of models on the site loaded by the QR scanner</a:t>
+            </a:r>
+          </a:p>
+          <a:p>
+            <a:r>
+              <a:rPr lang="en-US" dirty="0"/>
+              <a:t>Dependent on user having</a:t>
+            </a:r>
+          </a:p>
+          <a:p>
+            <a:pPr lvl="1"/>
+            <a:r>
+              <a:rPr lang="en-US" dirty="0"/>
+              <a:t>Google Cardboard hardware </a:t>
+            </a:r>
+          </a:p>
+          <a:p>
+            <a:pPr lvl="1"/>
+            <a:r>
+              <a:rPr lang="en-US" dirty="0"/>
+              <a:t>Google Cardboard application</a:t>
+            </a:r>
+          </a:p>
+          <a:p>
+            <a:pPr lvl="1"/>
+            <a:r>
+              <a:rPr lang="en-US" dirty="0"/>
+              <a:t>Android Device Lollipop+</a:t>
             </a:r>
           </a:p>
         </p:txBody>
@@ -3898,7 +3934,7 @@
     </p:spTree>
     <p:extLst>
       <p:ext uri="{BB962C8B-B14F-4D97-AF65-F5344CB8AC3E}">
-        <p14:creationId xmlns:p14="http://schemas.microsoft.com/office/powerpoint/2010/main" val="1095674573"/>
+        <p14:creationId xmlns:p14="http://schemas.microsoft.com/office/powerpoint/2010/main" val="1648740225"/>
       </p:ext>
     </p:extLst>
   </p:cSld>
@@ -3942,7 +3978,7 @@
           <a:p>
             <a:r>
               <a:rPr lang="en-US" dirty="0"/>
-              <a:t>Viewing VR Design</a:t>
+              <a:t>Data Management Design</a:t>
             </a:r>
           </a:p>
         </p:txBody>
@@ -3964,64 +4000,27 @@
           <a:p>
             <a:r>
               <a:rPr lang="en-US" dirty="0"/>
-              <a:t>Currently using Google Cardboard’s application</a:t>
-            </a:r>
-          </a:p>
-          <a:p>
-            <a:pPr lvl="1"/>
-            <a:r>
-              <a:rPr lang="en-US" dirty="0"/>
-              <a:t>Android WebView inside the application (</a:t>
-            </a:r>
-            <a:r>
-              <a:rPr lang="en-US" dirty="0" err="1"/>
-              <a:t>WebGL</a:t>
-            </a:r>
-            <a:r>
-              <a:rPr lang="en-US" dirty="0"/>
-              <a:t>)</a:t>
-            </a:r>
-          </a:p>
-          <a:p>
-            <a:r>
-              <a:rPr lang="en-US" dirty="0"/>
-              <a:t>This allows for VR viewing of models on the site loaded by the QR scanner</a:t>
-            </a:r>
-          </a:p>
-          <a:p>
-            <a:r>
-              <a:rPr lang="en-US" dirty="0"/>
-              <a:t>Dependent on user having</a:t>
-            </a:r>
-          </a:p>
-          <a:p>
-            <a:pPr lvl="1"/>
-            <a:r>
-              <a:rPr lang="en-US" dirty="0"/>
-              <a:t>Google Cardboard hardware </a:t>
-            </a:r>
-          </a:p>
-          <a:p>
-            <a:pPr lvl="1"/>
-            <a:r>
-              <a:rPr lang="en-US" dirty="0"/>
-              <a:t>Google Cardboard application</a:t>
-            </a:r>
-          </a:p>
-          <a:p>
-            <a:pPr lvl="1"/>
-            <a:r>
-              <a:rPr lang="en-US" dirty="0"/>
-              <a:t>Android Device Lollipop+</a:t>
-            </a:r>
-            <a:endParaRPr lang="en-US" dirty="0"/>
+              <a:t>Relies on 3 Legged Data Authentication being completed</a:t>
+            </a:r>
+          </a:p>
+          <a:p>
+            <a:r>
+              <a:rPr lang="en-US" dirty="0"/>
+              <a:t>User accesses files stored in A360 to use</a:t>
+            </a:r>
+          </a:p>
+          <a:p>
+            <a:r>
+              <a:rPr lang="en-US" dirty="0"/>
+              <a:t>Data management returns those files</a:t>
+            </a:r>
           </a:p>
         </p:txBody>
       </p:sp>
     </p:spTree>
     <p:extLst>
       <p:ext uri="{BB962C8B-B14F-4D97-AF65-F5344CB8AC3E}">
-        <p14:creationId xmlns:p14="http://schemas.microsoft.com/office/powerpoint/2010/main" val="1648740225"/>
+        <p14:creationId xmlns:p14="http://schemas.microsoft.com/office/powerpoint/2010/main" val="1095674573"/>
       </p:ext>
     </p:extLst>
   </p:cSld>
@@ -4139,36 +4138,6 @@
           </a:p>
         </p:txBody>
       </p:sp>
-      <p:pic>
-        <p:nvPicPr>
-          <p:cNvPr id="4" name="Picture 3"/>
-          <p:cNvPicPr>
-            <a:picLocks noChangeAspect="1"/>
-          </p:cNvPicPr>
-          <p:nvPr/>
-        </p:nvPicPr>
-        <p:blipFill>
-          <a:blip r:embed="rId2">
-            <a:extLst>
-              <a:ext uri="{28A0092B-C50C-407E-A947-70E740481C1C}">
-                <a14:useLocalDpi xmlns:a14="http://schemas.microsoft.com/office/drawing/2010/main" val="0"/>
-              </a:ext>
-            </a:extLst>
-          </a:blip>
-          <a:stretch>
-            <a:fillRect/>
-          </a:stretch>
-        </p:blipFill>
-        <p:spPr>
-          <a:xfrm>
-            <a:off x="6096000" y="2217291"/>
-            <a:ext cx="5902941" cy="2756607"/>
-          </a:xfrm>
-          <a:prstGeom prst="rect">
-            <a:avLst/>
-          </a:prstGeom>
-        </p:spPr>
-      </p:pic>
     </p:spTree>
     <p:extLst>
       <p:ext uri="{BB962C8B-B14F-4D97-AF65-F5344CB8AC3E}">
@@ -4320,7 +4289,7 @@
           <a:p>
             <a:r>
               <a:rPr lang="en-US" dirty="0"/>
-              <a:t>Model View Design</a:t>
+              <a:t>Smartphone Connection Design</a:t>
             </a:r>
           </a:p>
         </p:txBody>
@@ -4342,81 +4311,72 @@
           <a:p>
             <a:r>
               <a:rPr lang="en-US" dirty="0"/>
-              <a:t>Forge Large Model Viewer</a:t>
-            </a:r>
-          </a:p>
-          <a:p>
-            <a:pPr lvl="1"/>
-            <a:r>
-              <a:rPr lang="en-US" dirty="0"/>
-              <a:t>Uses </a:t>
-            </a:r>
-            <a:r>
-              <a:rPr lang="en-US" dirty="0" err="1"/>
-              <a:t>WebGL</a:t>
-            </a:r>
+              <a:t>Assumptions</a:t>
+            </a:r>
+          </a:p>
+          <a:p>
+            <a:pPr lvl="1"/>
+            <a:r>
+              <a:rPr lang="en-US" dirty="0"/>
+              <a:t>User has “smartphone”</a:t>
+            </a:r>
+          </a:p>
+          <a:p>
+            <a:pPr lvl="1"/>
+            <a:r>
+              <a:rPr lang="en-US" dirty="0"/>
+              <a:t>User has internet access</a:t>
+            </a:r>
+          </a:p>
+          <a:p>
+            <a:pPr lvl="1"/>
+            <a:r>
+              <a:rPr lang="en-US" dirty="0"/>
+              <a:t>User has QR scanner</a:t>
+            </a:r>
+          </a:p>
+          <a:p>
+            <a:r>
+              <a:rPr lang="en-US" dirty="0"/>
+              <a:t>Mobile device can access site with QR scanner</a:t>
+            </a:r>
+          </a:p>
+          <a:p>
+            <a:r>
+              <a:rPr lang="en-US" dirty="0"/>
+              <a:t>Components</a:t>
+            </a:r>
+          </a:p>
+          <a:p>
+            <a:pPr lvl="1"/>
+            <a:r>
+              <a:rPr lang="en-US" dirty="0"/>
+              <a:t>QR code</a:t>
+            </a:r>
+          </a:p>
+          <a:p>
+            <a:pPr lvl="1"/>
+            <a:r>
+              <a:rPr lang="en-US" dirty="0"/>
+              <a:t>Device connection</a:t>
+            </a:r>
+          </a:p>
+          <a:p>
+            <a:pPr lvl="1"/>
+            <a:r>
+              <a:rPr lang="en-US" dirty="0"/>
+              <a:t>Device view</a:t>
+            </a:r>
+          </a:p>
+          <a:p>
             <a:endParaRPr lang="en-US" dirty="0"/>
-          </a:p>
-          <a:p>
-            <a:pPr lvl="1"/>
-            <a:r>
-              <a:rPr lang="en-US" dirty="0"/>
-              <a:t>Renders SVF model on webpage</a:t>
-            </a:r>
-          </a:p>
-          <a:p>
-            <a:r>
-              <a:rPr lang="en-US" dirty="0"/>
-              <a:t>Model is interactive</a:t>
-            </a:r>
-          </a:p>
-          <a:p>
-            <a:r>
-              <a:rPr lang="en-US" dirty="0"/>
-              <a:t>Components</a:t>
-            </a:r>
-          </a:p>
-          <a:p>
-            <a:pPr lvl="1"/>
-            <a:r>
-              <a:rPr lang="en-US" dirty="0"/>
-              <a:t>Main view window</a:t>
-            </a:r>
-          </a:p>
-          <a:p>
-            <a:pPr lvl="1"/>
-            <a:r>
-              <a:rPr lang="en-US" dirty="0"/>
-              <a:t>Listed Models</a:t>
-            </a:r>
-          </a:p>
-          <a:p>
-            <a:pPr lvl="1"/>
-            <a:r>
-              <a:rPr lang="en-US" dirty="0"/>
-              <a:t>Viewer Controls</a:t>
-            </a:r>
-          </a:p>
-          <a:p>
-            <a:pPr lvl="1"/>
-            <a:r>
-              <a:rPr lang="en-US" dirty="0"/>
-              <a:t>Model viewer navigation</a:t>
-            </a:r>
-          </a:p>
-          <a:p>
-            <a:pPr lvl="1"/>
-            <a:r>
-              <a:rPr lang="en-US" dirty="0"/>
-              <a:t>Mobile Viewer</a:t>
-            </a:r>
           </a:p>
         </p:txBody>
       </p:sp>
     </p:spTree>
     <p:extLst>
       <p:ext uri="{BB962C8B-B14F-4D97-AF65-F5344CB8AC3E}">
-        <p14:creationId xmlns:p14="http://schemas.microsoft.com/office/powerpoint/2010/main" val="1887009037"/>
+        <p14:creationId xmlns:p14="http://schemas.microsoft.com/office/powerpoint/2010/main" val="3684780182"/>
       </p:ext>
     </p:extLst>
   </p:cSld>
@@ -4460,7 +4420,7 @@
           <a:p>
             <a:r>
               <a:rPr lang="en-US" dirty="0"/>
-              <a:t>Model Derivative Design (File Conversion)</a:t>
+              <a:t>Model View Design</a:t>
             </a:r>
           </a:p>
         </p:txBody>
@@ -4482,36 +4442,81 @@
           <a:p>
             <a:r>
               <a:rPr lang="en-US" dirty="0"/>
-              <a:t>Uploaded files (local or not) sent </a:t>
-            </a:r>
-          </a:p>
-          <a:p>
-            <a:r>
-              <a:rPr lang="en-US" dirty="0"/>
-              <a:t>API accepts CAD files</a:t>
-            </a:r>
-          </a:p>
-          <a:p>
-            <a:r>
-              <a:rPr lang="en-US" dirty="0"/>
-              <a:t>Failure is notified to user</a:t>
-            </a:r>
-          </a:p>
-          <a:p>
-            <a:r>
-              <a:rPr lang="en-US" dirty="0"/>
-              <a:t>Success results in converted SVF file</a:t>
-            </a:r>
-          </a:p>
-          <a:p>
+              <a:t>Forge Large Model Viewer</a:t>
+            </a:r>
+          </a:p>
+          <a:p>
+            <a:pPr lvl="1"/>
+            <a:r>
+              <a:rPr lang="en-US" dirty="0"/>
+              <a:t>Uses </a:t>
+            </a:r>
+            <a:r>
+              <a:rPr lang="en-US" dirty="0" err="1"/>
+              <a:t>WebGL</a:t>
+            </a:r>
             <a:endParaRPr lang="en-US" dirty="0"/>
+          </a:p>
+          <a:p>
+            <a:pPr lvl="1"/>
+            <a:r>
+              <a:rPr lang="en-US" dirty="0"/>
+              <a:t>Renders SVF model on webpage</a:t>
+            </a:r>
+          </a:p>
+          <a:p>
+            <a:r>
+              <a:rPr lang="en-US" dirty="0"/>
+              <a:t>Model is interactive</a:t>
+            </a:r>
+          </a:p>
+          <a:p>
+            <a:r>
+              <a:rPr lang="en-US" dirty="0"/>
+              <a:t>Components</a:t>
+            </a:r>
+          </a:p>
+          <a:p>
+            <a:pPr lvl="1"/>
+            <a:r>
+              <a:rPr lang="en-US" dirty="0"/>
+              <a:t>Main view window</a:t>
+            </a:r>
+          </a:p>
+          <a:p>
+            <a:pPr lvl="1"/>
+            <a:r>
+              <a:rPr lang="en-US" dirty="0"/>
+              <a:t>Listed Models</a:t>
+            </a:r>
+          </a:p>
+          <a:p>
+            <a:pPr lvl="1"/>
+            <a:r>
+              <a:rPr lang="en-US" dirty="0"/>
+              <a:t>Viewer Controls</a:t>
+            </a:r>
+          </a:p>
+          <a:p>
+            <a:pPr lvl="1"/>
+            <a:r>
+              <a:rPr lang="en-US" dirty="0"/>
+              <a:t>Model viewer navigation</a:t>
+            </a:r>
+          </a:p>
+          <a:p>
+            <a:pPr lvl="1"/>
+            <a:r>
+              <a:rPr lang="en-US" dirty="0"/>
+              <a:t>Mobile Viewer</a:t>
+            </a:r>
           </a:p>
         </p:txBody>
       </p:sp>
     </p:spTree>
     <p:extLst>
       <p:ext uri="{BB962C8B-B14F-4D97-AF65-F5344CB8AC3E}">
-        <p14:creationId xmlns:p14="http://schemas.microsoft.com/office/powerpoint/2010/main" val="539222828"/>
+        <p14:creationId xmlns:p14="http://schemas.microsoft.com/office/powerpoint/2010/main" val="1887009037"/>
       </p:ext>
     </p:extLst>
   </p:cSld>
@@ -4555,7 +4560,7 @@
           <a:p>
             <a:r>
               <a:rPr lang="en-US" dirty="0"/>
-              <a:t>Local File Upload Design</a:t>
+              <a:t>Model Derivative Design (File Conversion)</a:t>
             </a:r>
           </a:p>
         </p:txBody>
@@ -4577,77 +4582,36 @@
           <a:p>
             <a:r>
               <a:rPr lang="en-US" dirty="0"/>
-              <a:t>Select files on local machine</a:t>
-            </a:r>
-          </a:p>
-          <a:p>
-            <a:pPr lvl="1"/>
-            <a:r>
-              <a:rPr lang="en-US" dirty="0"/>
-              <a:t>Site verifies file type</a:t>
-            </a:r>
-          </a:p>
-          <a:p>
-            <a:pPr lvl="1"/>
-            <a:r>
-              <a:rPr lang="en-US" dirty="0"/>
-              <a:t>Conversion to SVF type</a:t>
-            </a:r>
-          </a:p>
-          <a:p>
-            <a:pPr lvl="1"/>
-            <a:r>
-              <a:rPr lang="en-US" dirty="0"/>
-              <a:t>Returns success/failure</a:t>
-            </a:r>
-          </a:p>
-          <a:p>
-            <a:r>
-              <a:rPr lang="en-US" dirty="0"/>
-              <a:t>Components</a:t>
-            </a:r>
-          </a:p>
-          <a:p>
-            <a:pPr lvl="1"/>
-            <a:r>
-              <a:rPr lang="en-US" dirty="0"/>
-              <a:t>Local Upload button</a:t>
-            </a:r>
-          </a:p>
-          <a:p>
-            <a:pPr lvl="1"/>
-            <a:r>
-              <a:rPr lang="en-US" dirty="0"/>
-              <a:t>File selection</a:t>
-            </a:r>
-          </a:p>
-          <a:p>
-            <a:pPr lvl="1"/>
-            <a:r>
-              <a:rPr lang="en-US" dirty="0"/>
-              <a:t>File type verification</a:t>
-            </a:r>
-          </a:p>
-          <a:p>
-            <a:pPr lvl="1"/>
-            <a:r>
-              <a:rPr lang="en-US" dirty="0"/>
-              <a:t>File size verification</a:t>
-            </a:r>
-          </a:p>
-          <a:p>
-            <a:pPr lvl="1"/>
-            <a:r>
-              <a:rPr lang="en-US" dirty="0"/>
-              <a:t>File conversion</a:t>
-            </a:r>
+              <a:t>Uploaded files (local or not) sent </a:t>
+            </a:r>
+          </a:p>
+          <a:p>
+            <a:r>
+              <a:rPr lang="en-US" dirty="0"/>
+              <a:t>API accepts CAD files</a:t>
+            </a:r>
+          </a:p>
+          <a:p>
+            <a:r>
+              <a:rPr lang="en-US" dirty="0"/>
+              <a:t>Failure is notified to user</a:t>
+            </a:r>
+          </a:p>
+          <a:p>
+            <a:r>
+              <a:rPr lang="en-US" dirty="0"/>
+              <a:t>Success results in converted SVF file</a:t>
+            </a:r>
+          </a:p>
+          <a:p>
+            <a:endParaRPr lang="en-US" dirty="0"/>
           </a:p>
         </p:txBody>
       </p:sp>
     </p:spTree>
     <p:extLst>
       <p:ext uri="{BB962C8B-B14F-4D97-AF65-F5344CB8AC3E}">
-        <p14:creationId xmlns:p14="http://schemas.microsoft.com/office/powerpoint/2010/main" val="3288010801"/>
+        <p14:creationId xmlns:p14="http://schemas.microsoft.com/office/powerpoint/2010/main" val="539222828"/>
       </p:ext>
     </p:extLst>
   </p:cSld>
@@ -4691,7 +4655,7 @@
           <a:p>
             <a:r>
               <a:rPr lang="en-US" dirty="0"/>
-              <a:t>Non Local File Upload Design</a:t>
+              <a:t>Local File Upload Design</a:t>
             </a:r>
           </a:p>
         </p:txBody>
@@ -4713,34 +4677,66 @@
           <a:p>
             <a:r>
               <a:rPr lang="en-US" dirty="0"/>
-              <a:t>Login to Autodesk account</a:t>
-            </a:r>
-          </a:p>
-          <a:p>
-            <a:r>
-              <a:rPr lang="en-US" dirty="0"/>
-              <a:t>Give site permissions</a:t>
-            </a:r>
-          </a:p>
-          <a:p>
-            <a:r>
-              <a:rPr lang="en-US" dirty="0"/>
-              <a:t>Directed to A360 for file selection</a:t>
-            </a:r>
-          </a:p>
-          <a:p>
+              <a:t>Select files on local machine</a:t>
+            </a:r>
+          </a:p>
+          <a:p>
+            <a:pPr lvl="1"/>
+            <a:r>
+              <a:rPr lang="en-US" dirty="0"/>
+              <a:t>Site verifies file type</a:t>
+            </a:r>
+          </a:p>
+          <a:p>
+            <a:pPr lvl="1"/>
+            <a:r>
+              <a:rPr lang="en-US" dirty="0"/>
+              <a:t>Conversion to SVF type</a:t>
+            </a:r>
+          </a:p>
+          <a:p>
+            <a:pPr lvl="1"/>
+            <a:r>
+              <a:rPr lang="en-US" dirty="0"/>
+              <a:t>Returns success/failure</a:t>
+            </a:r>
+          </a:p>
+          <a:p>
+            <a:r>
+              <a:rPr lang="en-US" dirty="0"/>
+              <a:t>Components</a:t>
+            </a:r>
+          </a:p>
+          <a:p>
+            <a:pPr lvl="1"/>
+            <a:r>
+              <a:rPr lang="en-US" dirty="0"/>
+              <a:t>Local Upload button</a:t>
+            </a:r>
+          </a:p>
+          <a:p>
+            <a:pPr lvl="1"/>
+            <a:r>
+              <a:rPr lang="en-US" dirty="0"/>
+              <a:t>File selection</a:t>
+            </a:r>
+          </a:p>
+          <a:p>
+            <a:pPr lvl="1"/>
             <a:r>
               <a:rPr lang="en-US" dirty="0"/>
               <a:t>File type verification</a:t>
             </a:r>
           </a:p>
           <a:p>
+            <a:pPr lvl="1"/>
             <a:r>
               <a:rPr lang="en-US" dirty="0"/>
               <a:t>File size verification</a:t>
             </a:r>
           </a:p>
           <a:p>
+            <a:pPr lvl="1"/>
             <a:r>
               <a:rPr lang="en-US" dirty="0"/>
               <a:t>File conversion</a:t>
@@ -4751,7 +4747,7 @@
     </p:spTree>
     <p:extLst>
       <p:ext uri="{BB962C8B-B14F-4D97-AF65-F5344CB8AC3E}">
-        <p14:creationId xmlns:p14="http://schemas.microsoft.com/office/powerpoint/2010/main" val="1188692582"/>
+        <p14:creationId xmlns:p14="http://schemas.microsoft.com/office/powerpoint/2010/main" val="3288010801"/>
       </p:ext>
     </p:extLst>
   </p:cSld>
@@ -4795,7 +4791,7 @@
           <a:p>
             <a:r>
               <a:rPr lang="en-US" dirty="0"/>
-              <a:t>Smartphone Connection Design</a:t>
+              <a:t>Non Local File Upload Design</a:t>
             </a:r>
           </a:p>
         </p:txBody>
@@ -4817,72 +4813,45 @@
           <a:p>
             <a:r>
               <a:rPr lang="en-US" dirty="0"/>
-              <a:t>Assumptions</a:t>
-            </a:r>
-          </a:p>
-          <a:p>
-            <a:pPr lvl="1"/>
-            <a:r>
-              <a:rPr lang="en-US" dirty="0"/>
-              <a:t>User has “smartphone”</a:t>
-            </a:r>
-          </a:p>
-          <a:p>
-            <a:pPr lvl="1"/>
-            <a:r>
-              <a:rPr lang="en-US" dirty="0"/>
-              <a:t>User has internet access</a:t>
-            </a:r>
-          </a:p>
-          <a:p>
-            <a:pPr lvl="1"/>
-            <a:r>
-              <a:rPr lang="en-US" dirty="0"/>
-              <a:t>User has QR scanner</a:t>
-            </a:r>
-          </a:p>
-          <a:p>
-            <a:r>
-              <a:rPr lang="en-US" dirty="0"/>
-              <a:t>Mobile device can access site with QR scanner</a:t>
-            </a:r>
-          </a:p>
-          <a:p>
-            <a:r>
-              <a:rPr lang="en-US" dirty="0"/>
-              <a:t>Components</a:t>
-            </a:r>
-          </a:p>
-          <a:p>
-            <a:pPr lvl="1"/>
-            <a:r>
-              <a:rPr lang="en-US" dirty="0"/>
-              <a:t>QR code</a:t>
-            </a:r>
-          </a:p>
-          <a:p>
-            <a:pPr lvl="1"/>
-            <a:r>
-              <a:rPr lang="en-US" dirty="0"/>
-              <a:t>Device connection</a:t>
-            </a:r>
-          </a:p>
-          <a:p>
-            <a:pPr lvl="1"/>
-            <a:r>
-              <a:rPr lang="en-US" dirty="0"/>
-              <a:t>Device view</a:t>
-            </a:r>
-          </a:p>
-          <a:p>
-            <a:endParaRPr lang="en-US" dirty="0"/>
+              <a:t>Login to Autodesk account</a:t>
+            </a:r>
+          </a:p>
+          <a:p>
+            <a:r>
+              <a:rPr lang="en-US" dirty="0"/>
+              <a:t>Give site permissions</a:t>
+            </a:r>
+          </a:p>
+          <a:p>
+            <a:r>
+              <a:rPr lang="en-US" dirty="0"/>
+              <a:t>Directed to A360 for file selection</a:t>
+            </a:r>
+          </a:p>
+          <a:p>
+            <a:r>
+              <a:rPr lang="en-US" dirty="0"/>
+              <a:t>File type verification</a:t>
+            </a:r>
+          </a:p>
+          <a:p>
+            <a:r>
+              <a:rPr lang="en-US" dirty="0"/>
+              <a:t>File size verification</a:t>
+            </a:r>
+          </a:p>
+          <a:p>
+            <a:r>
+              <a:rPr lang="en-US" dirty="0"/>
+              <a:t>File conversion</a:t>
+            </a:r>
           </a:p>
         </p:txBody>
       </p:sp>
     </p:spTree>
     <p:extLst>
       <p:ext uri="{BB962C8B-B14F-4D97-AF65-F5344CB8AC3E}">
-        <p14:creationId xmlns:p14="http://schemas.microsoft.com/office/powerpoint/2010/main" val="3684780182"/>
+        <p14:creationId xmlns:p14="http://schemas.microsoft.com/office/powerpoint/2010/main" val="1188692582"/>
       </p:ext>
     </p:extLst>
   </p:cSld>
@@ -5548,7 +5517,6 @@
               <a:rPr lang="en-US" dirty="0"/>
               <a:t>Week 8 </a:t>
             </a:r>
-            <a:endParaRPr lang="en-US" dirty="0"/>
           </a:p>
         </p:txBody>
       </p:sp>
@@ -5671,7 +5639,6 @@
               <a:rPr lang="en-US" dirty="0"/>
               <a:t>Week 9</a:t>
             </a:r>
-            <a:endParaRPr lang="en-US" dirty="0"/>
           </a:p>
         </p:txBody>
       </p:sp>
@@ -5778,7 +5745,6 @@
               <a:rPr lang="en-US" dirty="0"/>
               <a:t>Week 10</a:t>
             </a:r>
-            <a:endParaRPr lang="en-US" dirty="0"/>
           </a:p>
         </p:txBody>
       </p:sp>
@@ -6202,6 +6168,81 @@
 </p:sld>
 </file>
 
+<file path=ppt/slides/slide36.xml><?xml version="1.0" encoding="utf-8"?>
+<p:sld xmlns:a="http://schemas.openxmlformats.org/drawingml/2006/main" xmlns:r="http://schemas.openxmlformats.org/officeDocument/2006/relationships" xmlns:p="http://schemas.openxmlformats.org/presentationml/2006/main">
+  <p:cSld>
+    <p:spTree>
+      <p:nvGrpSpPr>
+        <p:cNvPr id="1" name=""/>
+        <p:cNvGrpSpPr/>
+        <p:nvPr/>
+      </p:nvGrpSpPr>
+      <p:grpSpPr>
+        <a:xfrm>
+          <a:off x="0" y="0"/>
+          <a:ext cx="0" cy="0"/>
+          <a:chOff x="0" y="0"/>
+          <a:chExt cx="0" cy="0"/>
+        </a:xfrm>
+      </p:grpSpPr>
+      <p:sp>
+        <p:nvSpPr>
+          <p:cNvPr id="2" name="Title 1"/>
+          <p:cNvSpPr>
+            <a:spLocks noGrp="1"/>
+          </p:cNvSpPr>
+          <p:nvPr>
+            <p:ph type="title"/>
+          </p:nvPr>
+        </p:nvSpPr>
+        <p:spPr/>
+        <p:txBody>
+          <a:bodyPr/>
+          <a:lstStyle/>
+          <a:p>
+            <a:r>
+              <a:rPr lang="en-US" dirty="0"/>
+              <a:t>References</a:t>
+            </a:r>
+          </a:p>
+        </p:txBody>
+      </p:sp>
+      <p:sp>
+        <p:nvSpPr>
+          <p:cNvPr id="3" name="Content Placeholder 2"/>
+          <p:cNvSpPr>
+            <a:spLocks noGrp="1"/>
+          </p:cNvSpPr>
+          <p:nvPr>
+            <p:ph idx="1"/>
+          </p:nvPr>
+        </p:nvSpPr>
+        <p:spPr/>
+        <p:txBody>
+          <a:bodyPr/>
+          <a:lstStyle/>
+          <a:p>
+            <a:r>
+              <a:rPr lang="en-US" dirty="0"/>
+              <a:t>https://developer.autodesk.com/</a:t>
+            </a:r>
+            <a:endParaRPr lang="en-US" dirty="0"/>
+          </a:p>
+        </p:txBody>
+      </p:sp>
+    </p:spTree>
+    <p:extLst>
+      <p:ext uri="{BB962C8B-B14F-4D97-AF65-F5344CB8AC3E}">
+        <p14:creationId xmlns:p14="http://schemas.microsoft.com/office/powerpoint/2010/main" val="1099164323"/>
+      </p:ext>
+    </p:extLst>
+  </p:cSld>
+  <p:clrMapOvr>
+    <a:masterClrMapping/>
+  </p:clrMapOvr>
+</p:sld>
+</file>
+
 <file path=ppt/slides/slide4.xml><?xml version="1.0" encoding="utf-8"?>
 <p:sld xmlns:a="http://schemas.openxmlformats.org/drawingml/2006/main" xmlns:r="http://schemas.openxmlformats.org/officeDocument/2006/relationships" xmlns:p="http://schemas.openxmlformats.org/presentationml/2006/main">
   <p:cSld>
@@ -6272,7 +6313,6 @@
               <a:rPr lang="en-US" dirty="0"/>
               <a:t>Week by week break down</a:t>
             </a:r>
-            <a:endParaRPr lang="en-US" dirty="0"/>
           </a:p>
           <a:p>
             <a:r>

</xml_diff>